<commit_message>
Added Dry run for Function taking object as parameter
</commit_message>
<xml_diff>
--- a/Classes And Objects/Functions CPP.pptx
+++ b/Classes And Objects/Functions CPP.pptx
@@ -6,17 +6,21 @@
   </p:sldMasterIdLst>
   <p:sldIdLst>
     <p:sldId id="256" r:id="rId2"/>
-    <p:sldId id="268" r:id="rId3"/>
-    <p:sldId id="274" r:id="rId4"/>
+    <p:sldId id="274" r:id="rId3"/>
+    <p:sldId id="268" r:id="rId4"/>
     <p:sldId id="257" r:id="rId5"/>
-    <p:sldId id="269" r:id="rId6"/>
-    <p:sldId id="272" r:id="rId7"/>
-    <p:sldId id="270" r:id="rId8"/>
-    <p:sldId id="273" r:id="rId9"/>
-    <p:sldId id="271" r:id="rId10"/>
-    <p:sldId id="266" r:id="rId11"/>
-    <p:sldId id="267" r:id="rId12"/>
-    <p:sldId id="261" r:id="rId13"/>
+    <p:sldId id="276" r:id="rId6"/>
+    <p:sldId id="277" r:id="rId7"/>
+    <p:sldId id="269" r:id="rId8"/>
+    <p:sldId id="275" r:id="rId9"/>
+    <p:sldId id="272" r:id="rId10"/>
+    <p:sldId id="270" r:id="rId11"/>
+    <p:sldId id="273" r:id="rId12"/>
+    <p:sldId id="271" r:id="rId13"/>
+    <p:sldId id="278" r:id="rId14"/>
+    <p:sldId id="266" r:id="rId15"/>
+    <p:sldId id="267" r:id="rId16"/>
+    <p:sldId id="261" r:id="rId17"/>
   </p:sldIdLst>
   <p:sldSz cx="9144000" cy="6858000" type="screen4x3"/>
   <p:notesSz cx="6858000" cy="9144000"/>
@@ -300,7 +304,7 @@
             <a:fld id="{1D8BD707-D9CF-40AE-B4C6-C98DA3205C09}" type="datetimeFigureOut">
               <a:rPr lang="en-US" smtClean="0"/>
               <a:pPr/>
-              <a:t>7/30/2020</a:t>
+              <a:t>8/7/2020</a:t>
             </a:fld>
             <a:endParaRPr lang="en-US"/>
           </a:p>
@@ -467,7 +471,7 @@
             <a:fld id="{1D8BD707-D9CF-40AE-B4C6-C98DA3205C09}" type="datetimeFigureOut">
               <a:rPr lang="en-US" smtClean="0"/>
               <a:pPr/>
-              <a:t>7/30/2020</a:t>
+              <a:t>8/7/2020</a:t>
             </a:fld>
             <a:endParaRPr lang="en-US"/>
           </a:p>
@@ -644,7 +648,7 @@
             <a:fld id="{1D8BD707-D9CF-40AE-B4C6-C98DA3205C09}" type="datetimeFigureOut">
               <a:rPr lang="en-US" smtClean="0"/>
               <a:pPr/>
-              <a:t>7/30/2020</a:t>
+              <a:t>8/7/2020</a:t>
             </a:fld>
             <a:endParaRPr lang="en-US"/>
           </a:p>
@@ -811,7 +815,7 @@
             <a:fld id="{1D8BD707-D9CF-40AE-B4C6-C98DA3205C09}" type="datetimeFigureOut">
               <a:rPr lang="en-US" smtClean="0"/>
               <a:pPr/>
-              <a:t>7/30/2020</a:t>
+              <a:t>8/7/2020</a:t>
             </a:fld>
             <a:endParaRPr lang="en-US"/>
           </a:p>
@@ -1054,7 +1058,7 @@
             <a:fld id="{1D8BD707-D9CF-40AE-B4C6-C98DA3205C09}" type="datetimeFigureOut">
               <a:rPr lang="en-US" smtClean="0"/>
               <a:pPr/>
-              <a:t>7/30/2020</a:t>
+              <a:t>8/7/2020</a:t>
             </a:fld>
             <a:endParaRPr lang="en-US"/>
           </a:p>
@@ -1339,7 +1343,7 @@
             <a:fld id="{1D8BD707-D9CF-40AE-B4C6-C98DA3205C09}" type="datetimeFigureOut">
               <a:rPr lang="en-US" smtClean="0"/>
               <a:pPr/>
-              <a:t>7/30/2020</a:t>
+              <a:t>8/7/2020</a:t>
             </a:fld>
             <a:endParaRPr lang="en-US"/>
           </a:p>
@@ -1758,7 +1762,7 @@
             <a:fld id="{1D8BD707-D9CF-40AE-B4C6-C98DA3205C09}" type="datetimeFigureOut">
               <a:rPr lang="en-US" smtClean="0"/>
               <a:pPr/>
-              <a:t>7/30/2020</a:t>
+              <a:t>8/7/2020</a:t>
             </a:fld>
             <a:endParaRPr lang="en-US"/>
           </a:p>
@@ -1873,7 +1877,7 @@
             <a:fld id="{1D8BD707-D9CF-40AE-B4C6-C98DA3205C09}" type="datetimeFigureOut">
               <a:rPr lang="en-US" smtClean="0"/>
               <a:pPr/>
-              <a:t>7/30/2020</a:t>
+              <a:t>8/7/2020</a:t>
             </a:fld>
             <a:endParaRPr lang="en-US"/>
           </a:p>
@@ -1965,7 +1969,7 @@
             <a:fld id="{1D8BD707-D9CF-40AE-B4C6-C98DA3205C09}" type="datetimeFigureOut">
               <a:rPr lang="en-US" smtClean="0"/>
               <a:pPr/>
-              <a:t>7/30/2020</a:t>
+              <a:t>8/7/2020</a:t>
             </a:fld>
             <a:endParaRPr lang="en-US"/>
           </a:p>
@@ -2239,7 +2243,7 @@
             <a:fld id="{1D8BD707-D9CF-40AE-B4C6-C98DA3205C09}" type="datetimeFigureOut">
               <a:rPr lang="en-US" smtClean="0"/>
               <a:pPr/>
-              <a:t>7/30/2020</a:t>
+              <a:t>8/7/2020</a:t>
             </a:fld>
             <a:endParaRPr lang="en-US"/>
           </a:p>
@@ -2489,7 +2493,7 @@
             <a:fld id="{1D8BD707-D9CF-40AE-B4C6-C98DA3205C09}" type="datetimeFigureOut">
               <a:rPr lang="en-US" smtClean="0"/>
               <a:pPr/>
-              <a:t>7/30/2020</a:t>
+              <a:t>8/7/2020</a:t>
             </a:fld>
             <a:endParaRPr lang="en-US"/>
           </a:p>
@@ -2699,7 +2703,7 @@
             <a:fld id="{1D8BD707-D9CF-40AE-B4C6-C98DA3205C09}" type="datetimeFigureOut">
               <a:rPr lang="en-US" smtClean="0"/>
               <a:pPr/>
-              <a:t>7/30/2020</a:t>
+              <a:t>8/7/2020</a:t>
             </a:fld>
             <a:endParaRPr lang="en-US"/>
           </a:p>
@@ -3126,11 +3130,7 @@
           <a:p>
             <a:r>
               <a:rPr lang="en-IN" sz="1600" dirty="0" smtClean="0"/>
-              <a:t>By</a:t>
-            </a:r>
-            <a:r>
-              <a:rPr lang="en-IN" sz="1600" dirty="0" smtClean="0"/>
-              <a:t>: </a:t>
+              <a:t>By: </a:t>
             </a:r>
             <a:r>
               <a:rPr lang="en-IN" sz="1600" dirty="0" err="1" smtClean="0"/>
@@ -3200,1141 +3200,6 @@
 </file>
 
 <file path=ppt/slides/slide10.xml><?xml version="1.0" encoding="utf-8"?>
-<p:sld xmlns:a="http://schemas.openxmlformats.org/drawingml/2006/main" xmlns:r="http://schemas.openxmlformats.org/officeDocument/2006/relationships" xmlns:p="http://schemas.openxmlformats.org/presentationml/2006/main">
-  <p:cSld>
-    <p:spTree>
-      <p:nvGrpSpPr>
-        <p:cNvPr id="1" name=""/>
-        <p:cNvGrpSpPr/>
-        <p:nvPr/>
-      </p:nvGrpSpPr>
-      <p:grpSpPr>
-        <a:xfrm>
-          <a:off x="0" y="0"/>
-          <a:ext cx="0" cy="0"/>
-          <a:chOff x="0" y="0"/>
-          <a:chExt cx="0" cy="0"/>
-        </a:xfrm>
-      </p:grpSpPr>
-      <p:sp>
-        <p:nvSpPr>
-          <p:cNvPr id="2" name="Title 1"/>
-          <p:cNvSpPr>
-            <a:spLocks noGrp="1"/>
-          </p:cNvSpPr>
-          <p:nvPr>
-            <p:ph type="title"/>
-          </p:nvPr>
-        </p:nvSpPr>
-        <p:spPr/>
-        <p:txBody>
-          <a:bodyPr/>
-          <a:lstStyle/>
-          <a:p>
-            <a:r>
-              <a:rPr lang="en-IN" dirty="0" smtClean="0"/>
-              <a:t>Practice Box Class</a:t>
-            </a:r>
-            <a:endParaRPr lang="en-IN" dirty="0"/>
-          </a:p>
-        </p:txBody>
-      </p:sp>
-      <p:sp>
-        <p:nvSpPr>
-          <p:cNvPr id="3" name="Rectangle 2"/>
-          <p:cNvSpPr/>
-          <p:nvPr/>
-        </p:nvSpPr>
-        <p:spPr>
-          <a:xfrm>
-            <a:off x="685801" y="1828800"/>
-            <a:ext cx="8458200" cy="4801314"/>
-          </a:xfrm>
-          <a:prstGeom prst="rect">
-            <a:avLst/>
-          </a:prstGeom>
-        </p:spPr>
-        <p:txBody>
-          <a:bodyPr wrap="square">
-            <a:spAutoFit/>
-          </a:bodyPr>
-          <a:lstStyle/>
-          <a:p>
-            <a:r>
-              <a:rPr lang="en-IN" dirty="0" smtClean="0"/>
-              <a:t>Create a Box Class with below specification. </a:t>
-            </a:r>
-          </a:p>
-          <a:p>
-            <a:r>
-              <a:rPr lang="en-IN" dirty="0" smtClean="0"/>
-              <a:t>Width as data member</a:t>
-            </a:r>
-          </a:p>
-          <a:p>
-            <a:r>
-              <a:rPr lang="en-IN" dirty="0" smtClean="0"/>
-              <a:t>Height as data member</a:t>
-            </a:r>
-          </a:p>
-          <a:p>
-            <a:r>
-              <a:rPr lang="en-IN" dirty="0" err="1" smtClean="0"/>
-              <a:t>GetData</a:t>
-            </a:r>
-            <a:r>
-              <a:rPr lang="en-IN" dirty="0" smtClean="0"/>
-              <a:t> and </a:t>
-            </a:r>
-            <a:r>
-              <a:rPr lang="en-IN" dirty="0" err="1" smtClean="0"/>
-              <a:t>setData</a:t>
-            </a:r>
-            <a:r>
-              <a:rPr lang="en-IN" dirty="0" smtClean="0"/>
-              <a:t> as the Member functions. </a:t>
-            </a:r>
-          </a:p>
-          <a:p>
-            <a:endParaRPr lang="en-IN" dirty="0" smtClean="0"/>
-          </a:p>
-          <a:p>
-            <a:r>
-              <a:rPr lang="en-IN" dirty="0" smtClean="0"/>
-              <a:t>Create object of class </a:t>
-            </a:r>
-          </a:p>
-          <a:p>
-            <a:endParaRPr lang="en-IN" dirty="0" smtClean="0"/>
-          </a:p>
-          <a:p>
-            <a:r>
-              <a:rPr lang="en-IN" dirty="0" smtClean="0"/>
-              <a:t>Create non member function </a:t>
-            </a:r>
-            <a:r>
-              <a:rPr lang="en-IN" dirty="0" err="1" smtClean="0"/>
-              <a:t>printBox</a:t>
-            </a:r>
-            <a:r>
-              <a:rPr lang="en-IN" dirty="0" smtClean="0"/>
-              <a:t> which takes Box object as argument </a:t>
-            </a:r>
-          </a:p>
-          <a:p>
-            <a:r>
-              <a:rPr lang="en-IN" dirty="0" smtClean="0"/>
-              <a:t>and display </a:t>
-            </a:r>
-            <a:r>
-              <a:rPr lang="en-IN" dirty="0" smtClean="0"/>
-              <a:t>Data of passed box’s object . </a:t>
-            </a:r>
-          </a:p>
-          <a:p>
-            <a:endParaRPr lang="en-IN" dirty="0" smtClean="0"/>
-          </a:p>
-          <a:p>
-            <a:r>
-              <a:rPr lang="en-IN" dirty="0" smtClean="0"/>
-              <a:t>Create another member name </a:t>
-            </a:r>
-            <a:r>
-              <a:rPr lang="en-IN" dirty="0" err="1" smtClean="0"/>
-              <a:t>newBox</a:t>
-            </a:r>
-            <a:r>
-              <a:rPr lang="en-IN" dirty="0" smtClean="0"/>
-              <a:t> which takes box object as argument and </a:t>
-            </a:r>
-          </a:p>
-          <a:p>
-            <a:r>
-              <a:rPr lang="en-IN" dirty="0" smtClean="0"/>
-              <a:t>Return new box which has width double of the passed object box.  </a:t>
-            </a:r>
-          </a:p>
-          <a:p>
-            <a:endParaRPr lang="en-IN" dirty="0" smtClean="0"/>
-          </a:p>
-          <a:p>
-            <a:endParaRPr lang="en-IN" dirty="0" smtClean="0"/>
-          </a:p>
-          <a:p>
-            <a:endParaRPr lang="en-IN" dirty="0" smtClean="0"/>
-          </a:p>
-          <a:p>
-            <a:endParaRPr lang="en-IN" dirty="0" smtClean="0"/>
-          </a:p>
-          <a:p>
-            <a:endParaRPr lang="en-IN" dirty="0"/>
-          </a:p>
-        </p:txBody>
-      </p:sp>
-      <p:pic>
-        <p:nvPicPr>
-          <p:cNvPr id="4" name="Picture 1" descr="E:\Amit Kumar Trivedi\Learning\CPP\Question Pappers\logo.png"/>
-          <p:cNvPicPr>
-            <a:picLocks noChangeAspect="1" noChangeArrowheads="1"/>
-          </p:cNvPicPr>
-          <p:nvPr/>
-        </p:nvPicPr>
-        <p:blipFill>
-          <a:blip r:embed="rId2"/>
-          <a:srcRect/>
-          <a:stretch>
-            <a:fillRect/>
-          </a:stretch>
-        </p:blipFill>
-        <p:spPr bwMode="auto">
-          <a:xfrm>
-            <a:off x="381000" y="5486400"/>
-            <a:ext cx="1000125" cy="1000125"/>
-          </a:xfrm>
-          <a:prstGeom prst="rect">
-            <a:avLst/>
-          </a:prstGeom>
-          <a:noFill/>
-        </p:spPr>
-      </p:pic>
-    </p:spTree>
-  </p:cSld>
-  <p:clrMapOvr>
-    <a:masterClrMapping/>
-  </p:clrMapOvr>
-  <p:timing>
-    <p:tnLst>
-      <p:par>
-        <p:cTn id="1" dur="indefinite" restart="never" nodeType="tmRoot"/>
-      </p:par>
-    </p:tnLst>
-  </p:timing>
-</p:sld>
-</file>
-
-<file path=ppt/slides/slide11.xml><?xml version="1.0" encoding="utf-8"?>
-<p:sld xmlns:a="http://schemas.openxmlformats.org/drawingml/2006/main" xmlns:r="http://schemas.openxmlformats.org/officeDocument/2006/relationships" xmlns:p="http://schemas.openxmlformats.org/presentationml/2006/main">
-  <p:cSld>
-    <p:spTree>
-      <p:nvGrpSpPr>
-        <p:cNvPr id="1" name=""/>
-        <p:cNvGrpSpPr/>
-        <p:nvPr/>
-      </p:nvGrpSpPr>
-      <p:grpSpPr>
-        <a:xfrm>
-          <a:off x="0" y="0"/>
-          <a:ext cx="0" cy="0"/>
-          <a:chOff x="0" y="0"/>
-          <a:chExt cx="0" cy="0"/>
-        </a:xfrm>
-      </p:grpSpPr>
-      <p:sp>
-        <p:nvSpPr>
-          <p:cNvPr id="2" name="Title 1"/>
-          <p:cNvSpPr>
-            <a:spLocks noGrp="1"/>
-          </p:cNvSpPr>
-          <p:nvPr>
-            <p:ph type="title"/>
-          </p:nvPr>
-        </p:nvSpPr>
-        <p:spPr/>
-        <p:txBody>
-          <a:bodyPr/>
-          <a:lstStyle/>
-          <a:p>
-            <a:r>
-              <a:rPr lang="en-IN" dirty="0" smtClean="0"/>
-              <a:t>Summary</a:t>
-            </a:r>
-            <a:endParaRPr lang="en-IN" dirty="0"/>
-          </a:p>
-        </p:txBody>
-      </p:sp>
-      <p:sp>
-        <p:nvSpPr>
-          <p:cNvPr id="3" name="Rectangle 2"/>
-          <p:cNvSpPr/>
-          <p:nvPr/>
-        </p:nvSpPr>
-        <p:spPr>
-          <a:xfrm>
-            <a:off x="685800" y="1828800"/>
-            <a:ext cx="6936643" cy="3970318"/>
-          </a:xfrm>
-          <a:prstGeom prst="rect">
-            <a:avLst/>
-          </a:prstGeom>
-        </p:spPr>
-        <p:txBody>
-          <a:bodyPr wrap="none">
-            <a:spAutoFit/>
-          </a:bodyPr>
-          <a:lstStyle/>
-          <a:p>
-            <a:r>
-              <a:rPr lang="en-IN" dirty="0" smtClean="0"/>
-              <a:t>What is </a:t>
-            </a:r>
-            <a:r>
-              <a:rPr lang="en-IN" dirty="0" smtClean="0"/>
-              <a:t>Function </a:t>
-            </a:r>
-            <a:endParaRPr lang="en-IN" dirty="0" smtClean="0"/>
-          </a:p>
-          <a:p>
-            <a:r>
-              <a:rPr lang="en-IN" dirty="0" smtClean="0"/>
-              <a:t>Anatomy of function. </a:t>
-            </a:r>
-            <a:endParaRPr lang="en-IN" dirty="0" smtClean="0"/>
-          </a:p>
-          <a:p>
-            <a:r>
-              <a:rPr lang="en-IN" dirty="0" smtClean="0"/>
-              <a:t>Function calling </a:t>
-            </a:r>
-          </a:p>
-          <a:p>
-            <a:r>
-              <a:rPr lang="en-IN" dirty="0" smtClean="0"/>
-              <a:t>Function with no argument and return nothing </a:t>
-            </a:r>
-            <a:endParaRPr lang="en-IN" dirty="0" smtClean="0"/>
-          </a:p>
-          <a:p>
-            <a:r>
-              <a:rPr lang="en-IN" dirty="0" smtClean="0"/>
-              <a:t>Function with </a:t>
-            </a:r>
-            <a:r>
-              <a:rPr lang="en-IN" dirty="0" smtClean="0"/>
-              <a:t>argument </a:t>
-            </a:r>
-            <a:r>
-              <a:rPr lang="en-IN" dirty="0" smtClean="0"/>
-              <a:t>and return nothing </a:t>
-            </a:r>
-            <a:endParaRPr lang="en-IN" dirty="0" smtClean="0"/>
-          </a:p>
-          <a:p>
-            <a:r>
-              <a:rPr lang="en-IN" dirty="0" smtClean="0"/>
-              <a:t>Function with </a:t>
-            </a:r>
-            <a:r>
-              <a:rPr lang="en-IN" dirty="0" smtClean="0"/>
-              <a:t>argument </a:t>
-            </a:r>
-            <a:r>
-              <a:rPr lang="en-IN" dirty="0" smtClean="0"/>
-              <a:t>and return </a:t>
-            </a:r>
-            <a:r>
-              <a:rPr lang="en-IN" dirty="0" smtClean="0"/>
-              <a:t>Value</a:t>
-            </a:r>
-          </a:p>
-          <a:p>
-            <a:r>
-              <a:rPr lang="en-IN" dirty="0" smtClean="0"/>
-              <a:t>Practice for Sum Function </a:t>
-            </a:r>
-            <a:endParaRPr lang="en-IN" dirty="0" smtClean="0"/>
-          </a:p>
-          <a:p>
-            <a:r>
-              <a:rPr lang="en-IN" dirty="0" smtClean="0"/>
-              <a:t>Distance Class </a:t>
-            </a:r>
-          </a:p>
-          <a:p>
-            <a:r>
-              <a:rPr lang="en-IN" dirty="0" smtClean="0"/>
-              <a:t>Function Take class object as argument </a:t>
-            </a:r>
-            <a:endParaRPr lang="en-IN" dirty="0" smtClean="0"/>
-          </a:p>
-          <a:p>
-            <a:r>
-              <a:rPr lang="en-IN" dirty="0" smtClean="0"/>
-              <a:t>Function Take class object as argument </a:t>
-            </a:r>
-            <a:r>
-              <a:rPr lang="en-IN" dirty="0" smtClean="0"/>
-              <a:t>and return class object as value. </a:t>
-            </a:r>
-          </a:p>
-          <a:p>
-            <a:r>
-              <a:rPr lang="en-IN" dirty="0" smtClean="0"/>
-              <a:t>Practice Box Class </a:t>
-            </a:r>
-            <a:endParaRPr lang="en-IN" dirty="0" smtClean="0"/>
-          </a:p>
-          <a:p>
-            <a:endParaRPr lang="en-IN" dirty="0" smtClean="0"/>
-          </a:p>
-          <a:p>
-            <a:endParaRPr lang="en-IN" dirty="0" smtClean="0"/>
-          </a:p>
-          <a:p>
-            <a:endParaRPr lang="en-IN" dirty="0"/>
-          </a:p>
-        </p:txBody>
-      </p:sp>
-      <p:pic>
-        <p:nvPicPr>
-          <p:cNvPr id="4" name="Picture 1" descr="E:\Amit Kumar Trivedi\Learning\CPP\Question Pappers\logo.png"/>
-          <p:cNvPicPr>
-            <a:picLocks noChangeAspect="1" noChangeArrowheads="1"/>
-          </p:cNvPicPr>
-          <p:nvPr/>
-        </p:nvPicPr>
-        <p:blipFill>
-          <a:blip r:embed="rId2"/>
-          <a:srcRect/>
-          <a:stretch>
-            <a:fillRect/>
-          </a:stretch>
-        </p:blipFill>
-        <p:spPr bwMode="auto">
-          <a:xfrm>
-            <a:off x="381000" y="5629275"/>
-            <a:ext cx="1000125" cy="1000125"/>
-          </a:xfrm>
-          <a:prstGeom prst="rect">
-            <a:avLst/>
-          </a:prstGeom>
-          <a:noFill/>
-        </p:spPr>
-      </p:pic>
-    </p:spTree>
-  </p:cSld>
-  <p:clrMapOvr>
-    <a:masterClrMapping/>
-  </p:clrMapOvr>
-  <p:timing>
-    <p:tnLst>
-      <p:par>
-        <p:cTn id="1" dur="indefinite" restart="never" nodeType="tmRoot"/>
-      </p:par>
-    </p:tnLst>
-  </p:timing>
-</p:sld>
-</file>
-
-<file path=ppt/slides/slide12.xml><?xml version="1.0" encoding="utf-8"?>
-<p:sld xmlns:a="http://schemas.openxmlformats.org/drawingml/2006/main" xmlns:r="http://schemas.openxmlformats.org/officeDocument/2006/relationships" xmlns:p="http://schemas.openxmlformats.org/presentationml/2006/main">
-  <p:cSld>
-    <p:spTree>
-      <p:nvGrpSpPr>
-        <p:cNvPr id="1" name=""/>
-        <p:cNvGrpSpPr/>
-        <p:nvPr/>
-      </p:nvGrpSpPr>
-      <p:grpSpPr>
-        <a:xfrm>
-          <a:off x="0" y="0"/>
-          <a:ext cx="0" cy="0"/>
-          <a:chOff x="0" y="0"/>
-          <a:chExt cx="0" cy="0"/>
-        </a:xfrm>
-      </p:grpSpPr>
-      <p:sp>
-        <p:nvSpPr>
-          <p:cNvPr id="2" name="Title 1"/>
-          <p:cNvSpPr>
-            <a:spLocks noGrp="1"/>
-          </p:cNvSpPr>
-          <p:nvPr>
-            <p:ph type="title"/>
-          </p:nvPr>
-        </p:nvSpPr>
-        <p:spPr/>
-        <p:txBody>
-          <a:bodyPr/>
-          <a:lstStyle/>
-          <a:p>
-            <a:r>
-              <a:rPr lang="en-IN" dirty="0" smtClean="0"/>
-              <a:t>Thank you</a:t>
-            </a:r>
-            <a:endParaRPr lang="en-IN" dirty="0"/>
-          </a:p>
-        </p:txBody>
-      </p:sp>
-      <p:pic>
-        <p:nvPicPr>
-          <p:cNvPr id="3" name="Picture 1" descr="E:\Amit Kumar Trivedi\Learning\CPP\Question Pappers\logo.png"/>
-          <p:cNvPicPr>
-            <a:picLocks noChangeAspect="1" noChangeArrowheads="1"/>
-          </p:cNvPicPr>
-          <p:nvPr/>
-        </p:nvPicPr>
-        <p:blipFill>
-          <a:blip r:embed="rId2"/>
-          <a:srcRect/>
-          <a:stretch>
-            <a:fillRect/>
-          </a:stretch>
-        </p:blipFill>
-        <p:spPr bwMode="auto">
-          <a:xfrm>
-            <a:off x="381000" y="5486400"/>
-            <a:ext cx="1000125" cy="1000125"/>
-          </a:xfrm>
-          <a:prstGeom prst="rect">
-            <a:avLst/>
-          </a:prstGeom>
-          <a:noFill/>
-        </p:spPr>
-      </p:pic>
-    </p:spTree>
-  </p:cSld>
-  <p:clrMapOvr>
-    <a:masterClrMapping/>
-  </p:clrMapOvr>
-  <p:timing>
-    <p:tnLst>
-      <p:par>
-        <p:cTn id="1" dur="indefinite" restart="never" nodeType="tmRoot"/>
-      </p:par>
-    </p:tnLst>
-  </p:timing>
-</p:sld>
-</file>
-
-<file path=ppt/slides/slide2.xml><?xml version="1.0" encoding="utf-8"?>
-<p:sld xmlns:a="http://schemas.openxmlformats.org/drawingml/2006/main" xmlns:r="http://schemas.openxmlformats.org/officeDocument/2006/relationships" xmlns:p="http://schemas.openxmlformats.org/presentationml/2006/main">
-  <p:cSld>
-    <p:spTree>
-      <p:nvGrpSpPr>
-        <p:cNvPr id="1" name=""/>
-        <p:cNvGrpSpPr/>
-        <p:nvPr/>
-      </p:nvGrpSpPr>
-      <p:grpSpPr>
-        <a:xfrm>
-          <a:off x="0" y="0"/>
-          <a:ext cx="0" cy="0"/>
-          <a:chOff x="0" y="0"/>
-          <a:chExt cx="0" cy="0"/>
-        </a:xfrm>
-      </p:grpSpPr>
-      <p:sp>
-        <p:nvSpPr>
-          <p:cNvPr id="2" name="Title 1"/>
-          <p:cNvSpPr>
-            <a:spLocks noGrp="1"/>
-          </p:cNvSpPr>
-          <p:nvPr>
-            <p:ph type="title"/>
-          </p:nvPr>
-        </p:nvSpPr>
-        <p:spPr/>
-        <p:txBody>
-          <a:bodyPr/>
-          <a:lstStyle/>
-          <a:p>
-            <a:pPr fontAlgn="base"/>
-            <a:r>
-              <a:rPr lang="en-IN" dirty="0" smtClean="0"/>
-              <a:t>Basics of Function</a:t>
-            </a:r>
-            <a:endParaRPr lang="en-IN" dirty="0"/>
-          </a:p>
-        </p:txBody>
-      </p:sp>
-      <p:sp>
-        <p:nvSpPr>
-          <p:cNvPr id="4" name="TextBox 3"/>
-          <p:cNvSpPr txBox="1"/>
-          <p:nvPr/>
-        </p:nvSpPr>
-        <p:spPr>
-          <a:xfrm>
-            <a:off x="1524000" y="1066800"/>
-            <a:ext cx="7010400" cy="646331"/>
-          </a:xfrm>
-          <a:prstGeom prst="rect">
-            <a:avLst/>
-          </a:prstGeom>
-          <a:noFill/>
-        </p:spPr>
-        <p:txBody>
-          <a:bodyPr wrap="square" rtlCol="0">
-            <a:spAutoFit/>
-          </a:bodyPr>
-          <a:lstStyle/>
-          <a:p>
-            <a:r>
-              <a:rPr lang="en-IN" dirty="0" smtClean="0"/>
-              <a:t>Simple Functions which takes no argument and return nothing. </a:t>
-            </a:r>
-          </a:p>
-          <a:p>
-            <a:endParaRPr lang="en-IN" dirty="0"/>
-          </a:p>
-        </p:txBody>
-      </p:sp>
-      <p:pic>
-        <p:nvPicPr>
-          <p:cNvPr id="6" name="Picture 1" descr="E:\Amit Kumar Trivedi\Learning\CPP\Question Pappers\logo.png"/>
-          <p:cNvPicPr>
-            <a:picLocks noChangeAspect="1" noChangeArrowheads="1"/>
-          </p:cNvPicPr>
-          <p:nvPr/>
-        </p:nvPicPr>
-        <p:blipFill>
-          <a:blip r:embed="rId2"/>
-          <a:srcRect/>
-          <a:stretch>
-            <a:fillRect/>
-          </a:stretch>
-        </p:blipFill>
-        <p:spPr bwMode="auto">
-          <a:xfrm>
-            <a:off x="381000" y="5486400"/>
-            <a:ext cx="1000125" cy="1000125"/>
-          </a:xfrm>
-          <a:prstGeom prst="rect">
-            <a:avLst/>
-          </a:prstGeom>
-          <a:noFill/>
-        </p:spPr>
-      </p:pic>
-      <p:pic>
-        <p:nvPicPr>
-          <p:cNvPr id="1028" name="Picture 4"/>
-          <p:cNvPicPr>
-            <a:picLocks noChangeAspect="1" noChangeArrowheads="1"/>
-          </p:cNvPicPr>
-          <p:nvPr/>
-        </p:nvPicPr>
-        <p:blipFill>
-          <a:blip r:embed="rId3"/>
-          <a:srcRect/>
-          <a:stretch>
-            <a:fillRect/>
-          </a:stretch>
-        </p:blipFill>
-        <p:spPr bwMode="auto">
-          <a:xfrm>
-            <a:off x="1066800" y="1676400"/>
-            <a:ext cx="7065963" cy="4295775"/>
-          </a:xfrm>
-          <a:prstGeom prst="rect">
-            <a:avLst/>
-          </a:prstGeom>
-          <a:noFill/>
-          <a:ln w="9525">
-            <a:noFill/>
-            <a:miter lim="800000"/>
-            <a:headEnd/>
-            <a:tailEnd/>
-          </a:ln>
-          <a:effectLst/>
-        </p:spPr>
-      </p:pic>
-    </p:spTree>
-  </p:cSld>
-  <p:clrMapOvr>
-    <a:masterClrMapping/>
-  </p:clrMapOvr>
-  <p:timing>
-    <p:tnLst>
-      <p:par>
-        <p:cTn id="1" dur="indefinite" restart="never" nodeType="tmRoot"/>
-      </p:par>
-    </p:tnLst>
-  </p:timing>
-</p:sld>
-</file>
-
-<file path=ppt/slides/slide3.xml><?xml version="1.0" encoding="utf-8"?>
-<p:sld xmlns:a="http://schemas.openxmlformats.org/drawingml/2006/main" xmlns:r="http://schemas.openxmlformats.org/officeDocument/2006/relationships" xmlns:p="http://schemas.openxmlformats.org/presentationml/2006/main">
-  <p:cSld>
-    <p:spTree>
-      <p:nvGrpSpPr>
-        <p:cNvPr id="1" name=""/>
-        <p:cNvGrpSpPr/>
-        <p:nvPr/>
-      </p:nvGrpSpPr>
-      <p:grpSpPr>
-        <a:xfrm>
-          <a:off x="0" y="0"/>
-          <a:ext cx="0" cy="0"/>
-          <a:chOff x="0" y="0"/>
-          <a:chExt cx="0" cy="0"/>
-        </a:xfrm>
-      </p:grpSpPr>
-      <p:sp>
-        <p:nvSpPr>
-          <p:cNvPr id="2" name="Title 1"/>
-          <p:cNvSpPr>
-            <a:spLocks noGrp="1"/>
-          </p:cNvSpPr>
-          <p:nvPr>
-            <p:ph type="title"/>
-          </p:nvPr>
-        </p:nvSpPr>
-        <p:spPr/>
-        <p:txBody>
-          <a:bodyPr/>
-          <a:lstStyle/>
-          <a:p>
-            <a:r>
-              <a:rPr lang="en-IN" dirty="0" smtClean="0"/>
-              <a:t>Introduction </a:t>
-            </a:r>
-            <a:endParaRPr lang="en-IN" dirty="0"/>
-          </a:p>
-        </p:txBody>
-      </p:sp>
-      <p:sp>
-        <p:nvSpPr>
-          <p:cNvPr id="3" name="TextBox 2"/>
-          <p:cNvSpPr txBox="1"/>
-          <p:nvPr/>
-        </p:nvSpPr>
-        <p:spPr>
-          <a:xfrm>
-            <a:off x="1295400" y="1905000"/>
-            <a:ext cx="7010400" cy="1754326"/>
-          </a:xfrm>
-          <a:prstGeom prst="rect">
-            <a:avLst/>
-          </a:prstGeom>
-          <a:noFill/>
-        </p:spPr>
-        <p:txBody>
-          <a:bodyPr wrap="square" rtlCol="0">
-            <a:spAutoFit/>
-          </a:bodyPr>
-          <a:lstStyle/>
-          <a:p>
-            <a:r>
-              <a:rPr lang="en-IN" dirty="0" smtClean="0"/>
-              <a:t>Basics of Function. </a:t>
-            </a:r>
-          </a:p>
-          <a:p>
-            <a:r>
-              <a:rPr lang="en-IN" dirty="0" smtClean="0"/>
-              <a:t>Different types of Function </a:t>
-            </a:r>
-          </a:p>
-          <a:p>
-            <a:r>
-              <a:rPr lang="en-IN" dirty="0" smtClean="0"/>
-              <a:t>Function and Class</a:t>
-            </a:r>
-          </a:p>
-          <a:p>
-            <a:r>
-              <a:rPr lang="en-IN" dirty="0" smtClean="0"/>
-              <a:t>Function which takes class object as argument </a:t>
-            </a:r>
-          </a:p>
-          <a:p>
-            <a:r>
-              <a:rPr lang="en-IN" dirty="0" smtClean="0"/>
-              <a:t>Function which returns class object as value </a:t>
-            </a:r>
-          </a:p>
-          <a:p>
-            <a:endParaRPr lang="en-IN" dirty="0"/>
-          </a:p>
-        </p:txBody>
-      </p:sp>
-    </p:spTree>
-  </p:cSld>
-  <p:clrMapOvr>
-    <a:masterClrMapping/>
-  </p:clrMapOvr>
-</p:sld>
-</file>
-
-<file path=ppt/slides/slide4.xml><?xml version="1.0" encoding="utf-8"?>
-<p:sld xmlns:a="http://schemas.openxmlformats.org/drawingml/2006/main" xmlns:r="http://schemas.openxmlformats.org/officeDocument/2006/relationships" xmlns:p="http://schemas.openxmlformats.org/presentationml/2006/main">
-  <p:cSld>
-    <p:spTree>
-      <p:nvGrpSpPr>
-        <p:cNvPr id="1" name=""/>
-        <p:cNvGrpSpPr/>
-        <p:nvPr/>
-      </p:nvGrpSpPr>
-      <p:grpSpPr>
-        <a:xfrm>
-          <a:off x="0" y="0"/>
-          <a:ext cx="0" cy="0"/>
-          <a:chOff x="0" y="0"/>
-          <a:chExt cx="0" cy="0"/>
-        </a:xfrm>
-      </p:grpSpPr>
-      <p:sp>
-        <p:nvSpPr>
-          <p:cNvPr id="2" name="Title 1"/>
-          <p:cNvSpPr>
-            <a:spLocks noGrp="1"/>
-          </p:cNvSpPr>
-          <p:nvPr>
-            <p:ph type="title"/>
-          </p:nvPr>
-        </p:nvSpPr>
-        <p:spPr/>
-        <p:txBody>
-          <a:bodyPr/>
-          <a:lstStyle/>
-          <a:p>
-            <a:pPr fontAlgn="base"/>
-            <a:r>
-              <a:rPr lang="en-IN" dirty="0" smtClean="0"/>
-              <a:t>Functions Parameters </a:t>
-            </a:r>
-            <a:endParaRPr lang="en-IN" dirty="0"/>
-          </a:p>
-        </p:txBody>
-      </p:sp>
-      <p:sp>
-        <p:nvSpPr>
-          <p:cNvPr id="4" name="TextBox 3"/>
-          <p:cNvSpPr txBox="1"/>
-          <p:nvPr/>
-        </p:nvSpPr>
-        <p:spPr>
-          <a:xfrm>
-            <a:off x="1524000" y="1066800"/>
-            <a:ext cx="7010400" cy="646331"/>
-          </a:xfrm>
-          <a:prstGeom prst="rect">
-            <a:avLst/>
-          </a:prstGeom>
-          <a:noFill/>
-        </p:spPr>
-        <p:txBody>
-          <a:bodyPr wrap="square" rtlCol="0">
-            <a:spAutoFit/>
-          </a:bodyPr>
-          <a:lstStyle/>
-          <a:p>
-            <a:r>
-              <a:rPr lang="en-IN" dirty="0" smtClean="0"/>
-              <a:t>Function which take one arguments/parameter </a:t>
-            </a:r>
-          </a:p>
-          <a:p>
-            <a:endParaRPr lang="en-IN" dirty="0"/>
-          </a:p>
-        </p:txBody>
-      </p:sp>
-      <p:pic>
-        <p:nvPicPr>
-          <p:cNvPr id="6" name="Picture 1" descr="E:\Amit Kumar Trivedi\Learning\CPP\Question Pappers\logo.png"/>
-          <p:cNvPicPr>
-            <a:picLocks noChangeAspect="1" noChangeArrowheads="1"/>
-          </p:cNvPicPr>
-          <p:nvPr/>
-        </p:nvPicPr>
-        <p:blipFill>
-          <a:blip r:embed="rId2"/>
-          <a:srcRect/>
-          <a:stretch>
-            <a:fillRect/>
-          </a:stretch>
-        </p:blipFill>
-        <p:spPr bwMode="auto">
-          <a:xfrm>
-            <a:off x="0" y="6162675"/>
-            <a:ext cx="695325" cy="695325"/>
-          </a:xfrm>
-          <a:prstGeom prst="rect">
-            <a:avLst/>
-          </a:prstGeom>
-          <a:noFill/>
-        </p:spPr>
-      </p:pic>
-      <p:pic>
-        <p:nvPicPr>
-          <p:cNvPr id="1029" name="Picture 5" descr="E:\Amit Kumar Trivedi\Learning\CPP\Course Content\Section 2 Class and Objects\images\funtion with parameter.PNG"/>
-          <p:cNvPicPr>
-            <a:picLocks noChangeAspect="1" noChangeArrowheads="1"/>
-          </p:cNvPicPr>
-          <p:nvPr/>
-        </p:nvPicPr>
-        <p:blipFill>
-          <a:blip r:embed="rId3"/>
-          <a:srcRect/>
-          <a:stretch>
-            <a:fillRect/>
-          </a:stretch>
-        </p:blipFill>
-        <p:spPr bwMode="auto">
-          <a:xfrm>
-            <a:off x="228600" y="1600200"/>
-            <a:ext cx="8704263" cy="4400550"/>
-          </a:xfrm>
-          <a:prstGeom prst="rect">
-            <a:avLst/>
-          </a:prstGeom>
-          <a:noFill/>
-        </p:spPr>
-      </p:pic>
-    </p:spTree>
-  </p:cSld>
-  <p:clrMapOvr>
-    <a:masterClrMapping/>
-  </p:clrMapOvr>
-  <p:timing>
-    <p:tnLst>
-      <p:par>
-        <p:cTn id="1" dur="indefinite" restart="never" nodeType="tmRoot"/>
-      </p:par>
-    </p:tnLst>
-  </p:timing>
-</p:sld>
-</file>
-
-<file path=ppt/slides/slide5.xml><?xml version="1.0" encoding="utf-8"?>
-<p:sld xmlns:a="http://schemas.openxmlformats.org/drawingml/2006/main" xmlns:r="http://schemas.openxmlformats.org/officeDocument/2006/relationships" xmlns:p="http://schemas.openxmlformats.org/presentationml/2006/main">
-  <p:cSld>
-    <p:spTree>
-      <p:nvGrpSpPr>
-        <p:cNvPr id="1" name=""/>
-        <p:cNvGrpSpPr/>
-        <p:nvPr/>
-      </p:nvGrpSpPr>
-      <p:grpSpPr>
-        <a:xfrm>
-          <a:off x="0" y="0"/>
-          <a:ext cx="0" cy="0"/>
-          <a:chOff x="0" y="0"/>
-          <a:chExt cx="0" cy="0"/>
-        </a:xfrm>
-      </p:grpSpPr>
-      <p:sp>
-        <p:nvSpPr>
-          <p:cNvPr id="2" name="Title 1"/>
-          <p:cNvSpPr>
-            <a:spLocks noGrp="1"/>
-          </p:cNvSpPr>
-          <p:nvPr>
-            <p:ph type="title"/>
-          </p:nvPr>
-        </p:nvSpPr>
-        <p:spPr/>
-        <p:txBody>
-          <a:bodyPr/>
-          <a:lstStyle/>
-          <a:p>
-            <a:pPr fontAlgn="base"/>
-            <a:r>
-              <a:rPr lang="en-IN" dirty="0" smtClean="0"/>
-              <a:t> Functions returns value </a:t>
-            </a:r>
-            <a:endParaRPr lang="en-IN" dirty="0"/>
-          </a:p>
-        </p:txBody>
-      </p:sp>
-      <p:sp>
-        <p:nvSpPr>
-          <p:cNvPr id="4" name="TextBox 3"/>
-          <p:cNvSpPr txBox="1"/>
-          <p:nvPr/>
-        </p:nvSpPr>
-        <p:spPr>
-          <a:xfrm>
-            <a:off x="1524000" y="1066800"/>
-            <a:ext cx="7010400" cy="646331"/>
-          </a:xfrm>
-          <a:prstGeom prst="rect">
-            <a:avLst/>
-          </a:prstGeom>
-          <a:noFill/>
-        </p:spPr>
-        <p:txBody>
-          <a:bodyPr wrap="square" rtlCol="0">
-            <a:spAutoFit/>
-          </a:bodyPr>
-          <a:lstStyle/>
-          <a:p>
-            <a:r>
-              <a:rPr lang="en-IN" dirty="0" smtClean="0"/>
-              <a:t>Simple Functions which takes  argument and return VALUE</a:t>
-            </a:r>
-          </a:p>
-          <a:p>
-            <a:endParaRPr lang="en-IN" dirty="0"/>
-          </a:p>
-        </p:txBody>
-      </p:sp>
-      <p:pic>
-        <p:nvPicPr>
-          <p:cNvPr id="6" name="Picture 1" descr="E:\Amit Kumar Trivedi\Learning\CPP\Question Pappers\logo.png"/>
-          <p:cNvPicPr>
-            <a:picLocks noChangeAspect="1" noChangeArrowheads="1"/>
-          </p:cNvPicPr>
-          <p:nvPr/>
-        </p:nvPicPr>
-        <p:blipFill>
-          <a:blip r:embed="rId2"/>
-          <a:srcRect/>
-          <a:stretch>
-            <a:fillRect/>
-          </a:stretch>
-        </p:blipFill>
-        <p:spPr bwMode="auto">
-          <a:xfrm>
-            <a:off x="381000" y="5486400"/>
-            <a:ext cx="1000125" cy="1000125"/>
-          </a:xfrm>
-          <a:prstGeom prst="rect">
-            <a:avLst/>
-          </a:prstGeom>
-          <a:noFill/>
-        </p:spPr>
-      </p:pic>
-      <p:pic>
-        <p:nvPicPr>
-          <p:cNvPr id="3074" name="Picture 2" descr="E:\Amit Kumar Trivedi\Learning\CPP\Course Content\Section 2 Class and Objects\images\fucntion return value.PNG"/>
-          <p:cNvPicPr>
-            <a:picLocks noChangeAspect="1" noChangeArrowheads="1"/>
-          </p:cNvPicPr>
-          <p:nvPr/>
-        </p:nvPicPr>
-        <p:blipFill>
-          <a:blip r:embed="rId3"/>
-          <a:srcRect/>
-          <a:stretch>
-            <a:fillRect/>
-          </a:stretch>
-        </p:blipFill>
-        <p:spPr bwMode="auto">
-          <a:xfrm>
-            <a:off x="715963" y="1476375"/>
-            <a:ext cx="8275637" cy="4772025"/>
-          </a:xfrm>
-          <a:prstGeom prst="rect">
-            <a:avLst/>
-          </a:prstGeom>
-          <a:noFill/>
-        </p:spPr>
-      </p:pic>
-    </p:spTree>
-  </p:cSld>
-  <p:clrMapOvr>
-    <a:masterClrMapping/>
-  </p:clrMapOvr>
-  <p:timing>
-    <p:tnLst>
-      <p:par>
-        <p:cTn id="1" dur="indefinite" restart="never" nodeType="tmRoot"/>
-      </p:par>
-    </p:tnLst>
-  </p:timing>
-</p:sld>
-</file>
-
-<file path=ppt/slides/slide6.xml><?xml version="1.0" encoding="utf-8"?>
-<p:sld xmlns:a="http://schemas.openxmlformats.org/drawingml/2006/main" xmlns:r="http://schemas.openxmlformats.org/officeDocument/2006/relationships" xmlns:p="http://schemas.openxmlformats.org/presentationml/2006/main">
-  <p:cSld>
-    <p:spTree>
-      <p:nvGrpSpPr>
-        <p:cNvPr id="1" name=""/>
-        <p:cNvGrpSpPr/>
-        <p:nvPr/>
-      </p:nvGrpSpPr>
-      <p:grpSpPr>
-        <a:xfrm>
-          <a:off x="0" y="0"/>
-          <a:ext cx="0" cy="0"/>
-          <a:chOff x="0" y="0"/>
-          <a:chExt cx="0" cy="0"/>
-        </a:xfrm>
-      </p:grpSpPr>
-      <p:sp>
-        <p:nvSpPr>
-          <p:cNvPr id="2" name="Title 1"/>
-          <p:cNvSpPr>
-            <a:spLocks noGrp="1"/>
-          </p:cNvSpPr>
-          <p:nvPr>
-            <p:ph type="title"/>
-          </p:nvPr>
-        </p:nvSpPr>
-        <p:spPr/>
-        <p:txBody>
-          <a:bodyPr/>
-          <a:lstStyle/>
-          <a:p>
-            <a:r>
-              <a:rPr lang="en-IN" dirty="0" smtClean="0"/>
-              <a:t>Assignment</a:t>
-            </a:r>
-            <a:endParaRPr lang="en-IN" dirty="0"/>
-          </a:p>
-        </p:txBody>
-      </p:sp>
-      <p:sp>
-        <p:nvSpPr>
-          <p:cNvPr id="3" name="TextBox 2"/>
-          <p:cNvSpPr txBox="1"/>
-          <p:nvPr/>
-        </p:nvSpPr>
-        <p:spPr>
-          <a:xfrm>
-            <a:off x="1524000" y="1981200"/>
-            <a:ext cx="7010400" cy="923330"/>
-          </a:xfrm>
-          <a:prstGeom prst="rect">
-            <a:avLst/>
-          </a:prstGeom>
-          <a:noFill/>
-        </p:spPr>
-        <p:txBody>
-          <a:bodyPr wrap="square" rtlCol="0">
-            <a:spAutoFit/>
-          </a:bodyPr>
-          <a:lstStyle/>
-          <a:p>
-            <a:r>
-              <a:rPr lang="en-IN" dirty="0" smtClean="0"/>
-              <a:t>Create a function called sum. </a:t>
-            </a:r>
-          </a:p>
-          <a:p>
-            <a:r>
-              <a:rPr lang="en-IN" dirty="0" smtClean="0"/>
-              <a:t>Which takes two numbers as argument. </a:t>
-            </a:r>
-          </a:p>
-          <a:p>
-            <a:r>
-              <a:rPr lang="en-IN" dirty="0" smtClean="0"/>
-              <a:t>Function Return sum of the number passed in the argument. </a:t>
-            </a:r>
-            <a:endParaRPr lang="en-IN" dirty="0"/>
-          </a:p>
-        </p:txBody>
-      </p:sp>
-    </p:spTree>
-  </p:cSld>
-  <p:clrMapOvr>
-    <a:masterClrMapping/>
-  </p:clrMapOvr>
-  <p:timing>
-    <p:tnLst>
-      <p:par>
-        <p:cTn id="1" dur="indefinite" restart="never" nodeType="tmRoot"/>
-      </p:par>
-    </p:tnLst>
-  </p:timing>
-</p:sld>
-</file>
-
-<file path=ppt/slides/slide7.xml><?xml version="1.0" encoding="utf-8"?>
 <p:sld xmlns:a="http://schemas.openxmlformats.org/drawingml/2006/main" xmlns:r="http://schemas.openxmlformats.org/officeDocument/2006/relationships" xmlns:p="http://schemas.openxmlformats.org/presentationml/2006/main">
   <p:cSld>
     <p:spTree>
@@ -4514,7 +3379,7 @@
 </p:sld>
 </file>
 
-<file path=ppt/slides/slide8.xml><?xml version="1.0" encoding="utf-8"?>
+<file path=ppt/slides/slide11.xml><?xml version="1.0" encoding="utf-8"?>
 <p:sld xmlns:a="http://schemas.openxmlformats.org/drawingml/2006/main" xmlns:r="http://schemas.openxmlformats.org/officeDocument/2006/relationships" xmlns:p="http://schemas.openxmlformats.org/presentationml/2006/main">
   <p:cSld>
     <p:spTree>
@@ -4661,7 +3526,7 @@
 </p:sld>
 </file>
 
-<file path=ppt/slides/slide9.xml><?xml version="1.0" encoding="utf-8"?>
+<file path=ppt/slides/slide12.xml><?xml version="1.0" encoding="utf-8"?>
 <p:sld xmlns:a="http://schemas.openxmlformats.org/drawingml/2006/main" xmlns:r="http://schemas.openxmlformats.org/officeDocument/2006/relationships" xmlns:p="http://schemas.openxmlformats.org/presentationml/2006/main">
   <p:cSld>
     <p:spTree>
@@ -4791,6 +3656,1841 @@
           <a:effectLst/>
         </p:spPr>
       </p:pic>
+    </p:spTree>
+  </p:cSld>
+  <p:clrMapOvr>
+    <a:masterClrMapping/>
+  </p:clrMapOvr>
+  <p:timing>
+    <p:tnLst>
+      <p:par>
+        <p:cTn id="1" dur="indefinite" restart="never" nodeType="tmRoot"/>
+      </p:par>
+    </p:tnLst>
+  </p:timing>
+</p:sld>
+</file>
+
+<file path=ppt/slides/slide13.xml><?xml version="1.0" encoding="utf-8"?>
+<p:sld xmlns:a="http://schemas.openxmlformats.org/drawingml/2006/main" xmlns:r="http://schemas.openxmlformats.org/officeDocument/2006/relationships" xmlns:p="http://schemas.openxmlformats.org/presentationml/2006/main">
+  <p:cSld>
+    <p:spTree>
+      <p:nvGrpSpPr>
+        <p:cNvPr id="1" name=""/>
+        <p:cNvGrpSpPr/>
+        <p:nvPr/>
+      </p:nvGrpSpPr>
+      <p:grpSpPr>
+        <a:xfrm>
+          <a:off x="0" y="0"/>
+          <a:ext cx="0" cy="0"/>
+          <a:chOff x="0" y="0"/>
+          <a:chExt cx="0" cy="0"/>
+        </a:xfrm>
+      </p:grpSpPr>
+      <p:sp>
+        <p:nvSpPr>
+          <p:cNvPr id="2" name="Title 1"/>
+          <p:cNvSpPr>
+            <a:spLocks noGrp="1"/>
+          </p:cNvSpPr>
+          <p:nvPr>
+            <p:ph type="title"/>
+          </p:nvPr>
+        </p:nvSpPr>
+        <p:spPr/>
+        <p:txBody>
+          <a:bodyPr/>
+          <a:lstStyle/>
+          <a:p>
+            <a:r>
+              <a:rPr lang="en-IN" dirty="0" smtClean="0"/>
+              <a:t>Dry Run</a:t>
+            </a:r>
+            <a:endParaRPr lang="en-IN" dirty="0"/>
+          </a:p>
+        </p:txBody>
+      </p:sp>
+      <p:sp>
+        <p:nvSpPr>
+          <p:cNvPr id="3" name="TextBox 2"/>
+          <p:cNvSpPr txBox="1"/>
+          <p:nvPr/>
+        </p:nvSpPr>
+        <p:spPr>
+          <a:xfrm>
+            <a:off x="304800" y="1066800"/>
+            <a:ext cx="4511876" cy="5632311"/>
+          </a:xfrm>
+          <a:prstGeom prst="rect">
+            <a:avLst/>
+          </a:prstGeom>
+          <a:noFill/>
+        </p:spPr>
+        <p:txBody>
+          <a:bodyPr wrap="none" rtlCol="0">
+            <a:spAutoFit/>
+          </a:bodyPr>
+          <a:lstStyle/>
+          <a:p>
+            <a:endParaRPr lang="en-IN" dirty="0" smtClean="0"/>
+          </a:p>
+          <a:p>
+            <a:r>
+              <a:rPr lang="en-IN" dirty="0" err="1" smtClean="0"/>
+              <a:t>int</a:t>
+            </a:r>
+            <a:r>
+              <a:rPr lang="en-IN" dirty="0" smtClean="0"/>
+              <a:t> sum=0; </a:t>
+            </a:r>
+          </a:p>
+          <a:p>
+            <a:r>
+              <a:rPr lang="en-IN" dirty="0" smtClean="0"/>
+              <a:t>Distance d1; </a:t>
+            </a:r>
+          </a:p>
+          <a:p>
+            <a:r>
+              <a:rPr lang="en-IN" dirty="0" err="1" smtClean="0"/>
+              <a:t>Creats</a:t>
+            </a:r>
+            <a:r>
+              <a:rPr lang="en-IN" dirty="0" smtClean="0"/>
+              <a:t> and object of distance class named d1; </a:t>
+            </a:r>
+          </a:p>
+          <a:p>
+            <a:r>
+              <a:rPr lang="en-IN" dirty="0" smtClean="0"/>
+              <a:t>Memory Allocation </a:t>
+            </a:r>
+          </a:p>
+          <a:p>
+            <a:r>
+              <a:rPr lang="en-IN" dirty="0" smtClean="0"/>
+              <a:t>---------------</a:t>
+            </a:r>
+          </a:p>
+          <a:p>
+            <a:r>
+              <a:rPr lang="en-IN" dirty="0" smtClean="0"/>
+              <a:t>d1 {</a:t>
+            </a:r>
+          </a:p>
+          <a:p>
+            <a:r>
+              <a:rPr lang="en-IN" dirty="0" smtClean="0"/>
+              <a:t>	</a:t>
+            </a:r>
+            <a:r>
+              <a:rPr lang="en-IN" dirty="0" err="1" smtClean="0"/>
+              <a:t>int</a:t>
+            </a:r>
+            <a:r>
+              <a:rPr lang="en-IN" dirty="0" smtClean="0"/>
+              <a:t> feet=5: </a:t>
+            </a:r>
+          </a:p>
+          <a:p>
+            <a:r>
+              <a:rPr lang="en-IN" dirty="0" smtClean="0"/>
+              <a:t>	</a:t>
+            </a:r>
+            <a:r>
+              <a:rPr lang="en-IN" dirty="0" err="1" smtClean="0"/>
+              <a:t>int</a:t>
+            </a:r>
+            <a:r>
+              <a:rPr lang="en-IN" dirty="0" smtClean="0"/>
+              <a:t> inch=6; </a:t>
+            </a:r>
+          </a:p>
+          <a:p>
+            <a:r>
+              <a:rPr lang="en-IN" dirty="0" smtClean="0"/>
+              <a:t>}</a:t>
+            </a:r>
+          </a:p>
+          <a:p>
+            <a:endParaRPr lang="en-IN" dirty="0" smtClean="0"/>
+          </a:p>
+          <a:p>
+            <a:r>
+              <a:rPr lang="en-IN" dirty="0" err="1" smtClean="0"/>
+              <a:t>setdata</a:t>
+            </a:r>
+            <a:r>
+              <a:rPr lang="en-IN" dirty="0" smtClean="0"/>
+              <a:t> function will call on d1. </a:t>
+            </a:r>
+          </a:p>
+          <a:p>
+            <a:endParaRPr lang="en-IN" dirty="0" smtClean="0"/>
+          </a:p>
+          <a:p>
+            <a:r>
+              <a:rPr lang="en-IN" dirty="0" smtClean="0"/>
+              <a:t>d1.setData(5,6)</a:t>
+            </a:r>
+          </a:p>
+          <a:p>
+            <a:endParaRPr lang="en-IN" dirty="0" smtClean="0"/>
+          </a:p>
+          <a:p>
+            <a:r>
+              <a:rPr lang="en-IN" dirty="0" err="1" smtClean="0"/>
+              <a:t>int</a:t>
+            </a:r>
+            <a:r>
+              <a:rPr lang="en-IN" dirty="0" smtClean="0"/>
+              <a:t> x=5, </a:t>
+            </a:r>
+            <a:r>
+              <a:rPr lang="en-IN" dirty="0" err="1" smtClean="0"/>
+              <a:t>int</a:t>
+            </a:r>
+            <a:r>
+              <a:rPr lang="en-IN" dirty="0" smtClean="0"/>
+              <a:t> y=6; </a:t>
+            </a:r>
+          </a:p>
+          <a:p>
+            <a:endParaRPr lang="en-IN" dirty="0" smtClean="0"/>
+          </a:p>
+          <a:p>
+            <a:r>
+              <a:rPr lang="en-IN" dirty="0" smtClean="0"/>
+              <a:t>feet=x=5; </a:t>
+            </a:r>
+          </a:p>
+          <a:p>
+            <a:r>
+              <a:rPr lang="en-IN" dirty="0" smtClean="0"/>
+              <a:t>inch = y = 6; </a:t>
+            </a:r>
+          </a:p>
+          <a:p>
+            <a:r>
+              <a:rPr lang="en-IN" dirty="0" smtClean="0"/>
+              <a:t>Clear screen </a:t>
+            </a:r>
+          </a:p>
+        </p:txBody>
+      </p:sp>
+      <p:sp>
+        <p:nvSpPr>
+          <p:cNvPr id="4" name="TextBox 3"/>
+          <p:cNvSpPr txBox="1"/>
+          <p:nvPr/>
+        </p:nvSpPr>
+        <p:spPr>
+          <a:xfrm>
+            <a:off x="6096000" y="671691"/>
+            <a:ext cx="2614627" cy="6186309"/>
+          </a:xfrm>
+          <a:prstGeom prst="rect">
+            <a:avLst/>
+          </a:prstGeom>
+          <a:noFill/>
+        </p:spPr>
+        <p:txBody>
+          <a:bodyPr wrap="none" rtlCol="0">
+            <a:spAutoFit/>
+          </a:bodyPr>
+          <a:lstStyle/>
+          <a:p>
+            <a:endParaRPr lang="en-IN" dirty="0" smtClean="0"/>
+          </a:p>
+          <a:p>
+            <a:r>
+              <a:rPr lang="en-IN" dirty="0" smtClean="0"/>
+              <a:t>Function call </a:t>
+            </a:r>
+            <a:r>
+              <a:rPr lang="en-IN" dirty="0" err="1" smtClean="0"/>
+              <a:t>printDist</a:t>
+            </a:r>
+            <a:r>
+              <a:rPr lang="en-IN" dirty="0" smtClean="0"/>
+              <a:t>(d1)</a:t>
+            </a:r>
+          </a:p>
+          <a:p>
+            <a:r>
+              <a:rPr lang="en-IN" dirty="0" smtClean="0"/>
+              <a:t>Void </a:t>
+            </a:r>
+            <a:r>
+              <a:rPr lang="en-IN" dirty="0" err="1" smtClean="0"/>
+              <a:t>printDist</a:t>
+            </a:r>
+            <a:r>
+              <a:rPr lang="en-IN" dirty="0" smtClean="0"/>
+              <a:t>(Distance x)</a:t>
+            </a:r>
+          </a:p>
+          <a:p>
+            <a:r>
+              <a:rPr lang="en-IN" dirty="0" smtClean="0"/>
+              <a:t>Distance x=d1; </a:t>
+            </a:r>
+          </a:p>
+          <a:p>
+            <a:endParaRPr lang="en-IN" dirty="0" smtClean="0"/>
+          </a:p>
+          <a:p>
+            <a:r>
+              <a:rPr lang="en-IN" dirty="0" smtClean="0"/>
+              <a:t>X </a:t>
+            </a:r>
+          </a:p>
+          <a:p>
+            <a:r>
+              <a:rPr lang="en-IN" dirty="0" smtClean="0"/>
+              <a:t>{</a:t>
+            </a:r>
+          </a:p>
+          <a:p>
+            <a:r>
+              <a:rPr lang="en-IN" dirty="0" smtClean="0"/>
+              <a:t>	</a:t>
+            </a:r>
+            <a:r>
+              <a:rPr lang="en-IN" dirty="0" err="1" smtClean="0"/>
+              <a:t>int</a:t>
+            </a:r>
+            <a:r>
+              <a:rPr lang="en-IN" dirty="0" smtClean="0"/>
+              <a:t> feet=5; </a:t>
+            </a:r>
+          </a:p>
+          <a:p>
+            <a:r>
+              <a:rPr lang="en-IN" dirty="0" smtClean="0"/>
+              <a:t>	</a:t>
+            </a:r>
+            <a:r>
+              <a:rPr lang="en-IN" dirty="0" err="1" smtClean="0"/>
+              <a:t>int</a:t>
+            </a:r>
+            <a:r>
+              <a:rPr lang="en-IN" dirty="0" smtClean="0"/>
+              <a:t> inch=6; </a:t>
+            </a:r>
+          </a:p>
+          <a:p>
+            <a:r>
+              <a:rPr lang="en-IN" dirty="0" smtClean="0"/>
+              <a:t>}</a:t>
+            </a:r>
+          </a:p>
+          <a:p>
+            <a:endParaRPr lang="en-IN" dirty="0" smtClean="0"/>
+          </a:p>
+          <a:p>
+            <a:r>
+              <a:rPr lang="en-IN" dirty="0" err="1" smtClean="0"/>
+              <a:t>x.feet</a:t>
+            </a:r>
+            <a:r>
+              <a:rPr lang="en-IN" dirty="0" smtClean="0"/>
+              <a:t> =d1.feet= 5</a:t>
+            </a:r>
+          </a:p>
+          <a:p>
+            <a:r>
+              <a:rPr lang="en-IN" dirty="0" err="1" smtClean="0"/>
+              <a:t>x.inch</a:t>
+            </a:r>
+            <a:r>
+              <a:rPr lang="en-IN" dirty="0" smtClean="0"/>
+              <a:t> = d1.inch=6</a:t>
+            </a:r>
+          </a:p>
+          <a:p>
+            <a:endParaRPr lang="en-IN" dirty="0" smtClean="0"/>
+          </a:p>
+          <a:p>
+            <a:r>
+              <a:rPr lang="en-IN" dirty="0" err="1" smtClean="0"/>
+              <a:t>cout</a:t>
+            </a:r>
+            <a:r>
+              <a:rPr lang="en-IN" dirty="0" smtClean="0"/>
+              <a:t>&lt;&lt; "Inside Distance"</a:t>
+            </a:r>
+          </a:p>
+          <a:p>
+            <a:r>
+              <a:rPr lang="en-IN" dirty="0" err="1" smtClean="0"/>
+              <a:t>x.getData</a:t>
+            </a:r>
+            <a:r>
+              <a:rPr lang="en-IN" dirty="0" smtClean="0"/>
+              <a:t>(); </a:t>
+            </a:r>
+          </a:p>
+          <a:p>
+            <a:r>
+              <a:rPr lang="en-IN" dirty="0" err="1" smtClean="0"/>
+              <a:t>Cout</a:t>
+            </a:r>
+            <a:r>
+              <a:rPr lang="en-IN" dirty="0" smtClean="0"/>
+              <a:t>&lt;&lt; "feet "&lt;&lt; feet=5</a:t>
+            </a:r>
+          </a:p>
+          <a:p>
+            <a:endParaRPr lang="en-IN" dirty="0" smtClean="0"/>
+          </a:p>
+          <a:p>
+            <a:r>
+              <a:rPr lang="en-IN" dirty="0" smtClean="0"/>
+              <a:t>Feet 5</a:t>
+            </a:r>
+          </a:p>
+          <a:p>
+            <a:r>
+              <a:rPr lang="en-IN" dirty="0" smtClean="0"/>
+              <a:t>inch 6;</a:t>
+            </a:r>
+          </a:p>
+          <a:p>
+            <a:endParaRPr lang="en-IN" dirty="0" smtClean="0"/>
+          </a:p>
+          <a:p>
+            <a:endParaRPr lang="en-IN" dirty="0"/>
+          </a:p>
+        </p:txBody>
+      </p:sp>
+    </p:spTree>
+  </p:cSld>
+  <p:clrMapOvr>
+    <a:masterClrMapping/>
+  </p:clrMapOvr>
+</p:sld>
+</file>
+
+<file path=ppt/slides/slide14.xml><?xml version="1.0" encoding="utf-8"?>
+<p:sld xmlns:a="http://schemas.openxmlformats.org/drawingml/2006/main" xmlns:r="http://schemas.openxmlformats.org/officeDocument/2006/relationships" xmlns:p="http://schemas.openxmlformats.org/presentationml/2006/main">
+  <p:cSld>
+    <p:spTree>
+      <p:nvGrpSpPr>
+        <p:cNvPr id="1" name=""/>
+        <p:cNvGrpSpPr/>
+        <p:nvPr/>
+      </p:nvGrpSpPr>
+      <p:grpSpPr>
+        <a:xfrm>
+          <a:off x="0" y="0"/>
+          <a:ext cx="0" cy="0"/>
+          <a:chOff x="0" y="0"/>
+          <a:chExt cx="0" cy="0"/>
+        </a:xfrm>
+      </p:grpSpPr>
+      <p:sp>
+        <p:nvSpPr>
+          <p:cNvPr id="2" name="Title 1"/>
+          <p:cNvSpPr>
+            <a:spLocks noGrp="1"/>
+          </p:cNvSpPr>
+          <p:nvPr>
+            <p:ph type="title"/>
+          </p:nvPr>
+        </p:nvSpPr>
+        <p:spPr/>
+        <p:txBody>
+          <a:bodyPr/>
+          <a:lstStyle/>
+          <a:p>
+            <a:r>
+              <a:rPr lang="en-IN" dirty="0" smtClean="0"/>
+              <a:t>Practice Box Class</a:t>
+            </a:r>
+            <a:endParaRPr lang="en-IN" dirty="0"/>
+          </a:p>
+        </p:txBody>
+      </p:sp>
+      <p:sp>
+        <p:nvSpPr>
+          <p:cNvPr id="3" name="Rectangle 2"/>
+          <p:cNvSpPr/>
+          <p:nvPr/>
+        </p:nvSpPr>
+        <p:spPr>
+          <a:xfrm>
+            <a:off x="685801" y="1828800"/>
+            <a:ext cx="8458200" cy="4801314"/>
+          </a:xfrm>
+          <a:prstGeom prst="rect">
+            <a:avLst/>
+          </a:prstGeom>
+        </p:spPr>
+        <p:txBody>
+          <a:bodyPr wrap="square">
+            <a:spAutoFit/>
+          </a:bodyPr>
+          <a:lstStyle/>
+          <a:p>
+            <a:r>
+              <a:rPr lang="en-IN" dirty="0" smtClean="0"/>
+              <a:t>Create a Box Class with below specification. </a:t>
+            </a:r>
+          </a:p>
+          <a:p>
+            <a:r>
+              <a:rPr lang="en-IN" dirty="0" smtClean="0"/>
+              <a:t>Width as data member</a:t>
+            </a:r>
+          </a:p>
+          <a:p>
+            <a:r>
+              <a:rPr lang="en-IN" dirty="0" smtClean="0"/>
+              <a:t>Height as data member</a:t>
+            </a:r>
+          </a:p>
+          <a:p>
+            <a:r>
+              <a:rPr lang="en-IN" dirty="0" err="1" smtClean="0"/>
+              <a:t>GetData</a:t>
+            </a:r>
+            <a:r>
+              <a:rPr lang="en-IN" dirty="0" smtClean="0"/>
+              <a:t> and </a:t>
+            </a:r>
+            <a:r>
+              <a:rPr lang="en-IN" dirty="0" err="1" smtClean="0"/>
+              <a:t>setData</a:t>
+            </a:r>
+            <a:r>
+              <a:rPr lang="en-IN" dirty="0" smtClean="0"/>
+              <a:t> as the Member functions. </a:t>
+            </a:r>
+          </a:p>
+          <a:p>
+            <a:endParaRPr lang="en-IN" dirty="0" smtClean="0"/>
+          </a:p>
+          <a:p>
+            <a:r>
+              <a:rPr lang="en-IN" dirty="0" smtClean="0"/>
+              <a:t>Create object of class </a:t>
+            </a:r>
+          </a:p>
+          <a:p>
+            <a:endParaRPr lang="en-IN" dirty="0" smtClean="0"/>
+          </a:p>
+          <a:p>
+            <a:r>
+              <a:rPr lang="en-IN" dirty="0" smtClean="0"/>
+              <a:t>Create non member function </a:t>
+            </a:r>
+            <a:r>
+              <a:rPr lang="en-IN" dirty="0" err="1" smtClean="0"/>
+              <a:t>printBox</a:t>
+            </a:r>
+            <a:r>
+              <a:rPr lang="en-IN" dirty="0" smtClean="0"/>
+              <a:t> which takes Box object as argument </a:t>
+            </a:r>
+          </a:p>
+          <a:p>
+            <a:r>
+              <a:rPr lang="en-IN" dirty="0" smtClean="0"/>
+              <a:t>and display Data of passed box’s object . </a:t>
+            </a:r>
+          </a:p>
+          <a:p>
+            <a:endParaRPr lang="en-IN" dirty="0" smtClean="0"/>
+          </a:p>
+          <a:p>
+            <a:r>
+              <a:rPr lang="en-IN" dirty="0" smtClean="0"/>
+              <a:t>Create another member name </a:t>
+            </a:r>
+            <a:r>
+              <a:rPr lang="en-IN" dirty="0" err="1" smtClean="0"/>
+              <a:t>newBox</a:t>
+            </a:r>
+            <a:r>
+              <a:rPr lang="en-IN" dirty="0" smtClean="0"/>
+              <a:t> which takes box object as argument and </a:t>
+            </a:r>
+          </a:p>
+          <a:p>
+            <a:r>
+              <a:rPr lang="en-IN" dirty="0" smtClean="0"/>
+              <a:t>Return new box which has width double of the passed object box.  </a:t>
+            </a:r>
+          </a:p>
+          <a:p>
+            <a:endParaRPr lang="en-IN" dirty="0" smtClean="0"/>
+          </a:p>
+          <a:p>
+            <a:endParaRPr lang="en-IN" dirty="0" smtClean="0"/>
+          </a:p>
+          <a:p>
+            <a:endParaRPr lang="en-IN" dirty="0" smtClean="0"/>
+          </a:p>
+          <a:p>
+            <a:endParaRPr lang="en-IN" dirty="0" smtClean="0"/>
+          </a:p>
+          <a:p>
+            <a:endParaRPr lang="en-IN" dirty="0"/>
+          </a:p>
+        </p:txBody>
+      </p:sp>
+      <p:pic>
+        <p:nvPicPr>
+          <p:cNvPr id="4" name="Picture 1" descr="E:\Amit Kumar Trivedi\Learning\CPP\Question Pappers\logo.png"/>
+          <p:cNvPicPr>
+            <a:picLocks noChangeAspect="1" noChangeArrowheads="1"/>
+          </p:cNvPicPr>
+          <p:nvPr/>
+        </p:nvPicPr>
+        <p:blipFill>
+          <a:blip r:embed="rId2"/>
+          <a:srcRect/>
+          <a:stretch>
+            <a:fillRect/>
+          </a:stretch>
+        </p:blipFill>
+        <p:spPr bwMode="auto">
+          <a:xfrm>
+            <a:off x="381000" y="5486400"/>
+            <a:ext cx="1000125" cy="1000125"/>
+          </a:xfrm>
+          <a:prstGeom prst="rect">
+            <a:avLst/>
+          </a:prstGeom>
+          <a:noFill/>
+        </p:spPr>
+      </p:pic>
+    </p:spTree>
+  </p:cSld>
+  <p:clrMapOvr>
+    <a:masterClrMapping/>
+  </p:clrMapOvr>
+  <p:timing>
+    <p:tnLst>
+      <p:par>
+        <p:cTn id="1" dur="indefinite" restart="never" nodeType="tmRoot"/>
+      </p:par>
+    </p:tnLst>
+  </p:timing>
+</p:sld>
+</file>
+
+<file path=ppt/slides/slide15.xml><?xml version="1.0" encoding="utf-8"?>
+<p:sld xmlns:a="http://schemas.openxmlformats.org/drawingml/2006/main" xmlns:r="http://schemas.openxmlformats.org/officeDocument/2006/relationships" xmlns:p="http://schemas.openxmlformats.org/presentationml/2006/main">
+  <p:cSld>
+    <p:spTree>
+      <p:nvGrpSpPr>
+        <p:cNvPr id="1" name=""/>
+        <p:cNvGrpSpPr/>
+        <p:nvPr/>
+      </p:nvGrpSpPr>
+      <p:grpSpPr>
+        <a:xfrm>
+          <a:off x="0" y="0"/>
+          <a:ext cx="0" cy="0"/>
+          <a:chOff x="0" y="0"/>
+          <a:chExt cx="0" cy="0"/>
+        </a:xfrm>
+      </p:grpSpPr>
+      <p:sp>
+        <p:nvSpPr>
+          <p:cNvPr id="2" name="Title 1"/>
+          <p:cNvSpPr>
+            <a:spLocks noGrp="1"/>
+          </p:cNvSpPr>
+          <p:nvPr>
+            <p:ph type="title"/>
+          </p:nvPr>
+        </p:nvSpPr>
+        <p:spPr/>
+        <p:txBody>
+          <a:bodyPr/>
+          <a:lstStyle/>
+          <a:p>
+            <a:r>
+              <a:rPr lang="en-IN" dirty="0" smtClean="0"/>
+              <a:t>Summary</a:t>
+            </a:r>
+            <a:endParaRPr lang="en-IN" dirty="0"/>
+          </a:p>
+        </p:txBody>
+      </p:sp>
+      <p:sp>
+        <p:nvSpPr>
+          <p:cNvPr id="3" name="Rectangle 2"/>
+          <p:cNvSpPr/>
+          <p:nvPr/>
+        </p:nvSpPr>
+        <p:spPr>
+          <a:xfrm>
+            <a:off x="685800" y="1828800"/>
+            <a:ext cx="6936643" cy="3970318"/>
+          </a:xfrm>
+          <a:prstGeom prst="rect">
+            <a:avLst/>
+          </a:prstGeom>
+        </p:spPr>
+        <p:txBody>
+          <a:bodyPr wrap="none">
+            <a:spAutoFit/>
+          </a:bodyPr>
+          <a:lstStyle/>
+          <a:p>
+            <a:r>
+              <a:rPr lang="en-IN" dirty="0" smtClean="0"/>
+              <a:t>What is Function </a:t>
+            </a:r>
+          </a:p>
+          <a:p>
+            <a:r>
+              <a:rPr lang="en-IN" dirty="0" smtClean="0"/>
+              <a:t>Anatomy of function. </a:t>
+            </a:r>
+          </a:p>
+          <a:p>
+            <a:r>
+              <a:rPr lang="en-IN" dirty="0" smtClean="0"/>
+              <a:t>Function calling </a:t>
+            </a:r>
+          </a:p>
+          <a:p>
+            <a:r>
+              <a:rPr lang="en-IN" dirty="0" smtClean="0"/>
+              <a:t>Function with no argument and return nothing </a:t>
+            </a:r>
+          </a:p>
+          <a:p>
+            <a:r>
+              <a:rPr lang="en-IN" dirty="0" smtClean="0"/>
+              <a:t>Function with argument and return nothing </a:t>
+            </a:r>
+          </a:p>
+          <a:p>
+            <a:r>
+              <a:rPr lang="en-IN" dirty="0" smtClean="0"/>
+              <a:t>Function with argument and return Value</a:t>
+            </a:r>
+          </a:p>
+          <a:p>
+            <a:r>
+              <a:rPr lang="en-IN" dirty="0" smtClean="0"/>
+              <a:t>Practice for Sum Function </a:t>
+            </a:r>
+          </a:p>
+          <a:p>
+            <a:r>
+              <a:rPr lang="en-IN" dirty="0" smtClean="0"/>
+              <a:t>Distance Class </a:t>
+            </a:r>
+          </a:p>
+          <a:p>
+            <a:r>
+              <a:rPr lang="en-IN" dirty="0" smtClean="0"/>
+              <a:t>Function Take class object as argument </a:t>
+            </a:r>
+          </a:p>
+          <a:p>
+            <a:r>
+              <a:rPr lang="en-IN" dirty="0" smtClean="0"/>
+              <a:t>Function Take class object as argument and return class object as value. </a:t>
+            </a:r>
+          </a:p>
+          <a:p>
+            <a:r>
+              <a:rPr lang="en-IN" dirty="0" smtClean="0"/>
+              <a:t>Practice Box Class </a:t>
+            </a:r>
+          </a:p>
+          <a:p>
+            <a:endParaRPr lang="en-IN" dirty="0" smtClean="0"/>
+          </a:p>
+          <a:p>
+            <a:endParaRPr lang="en-IN" dirty="0" smtClean="0"/>
+          </a:p>
+          <a:p>
+            <a:endParaRPr lang="en-IN" dirty="0"/>
+          </a:p>
+        </p:txBody>
+      </p:sp>
+      <p:pic>
+        <p:nvPicPr>
+          <p:cNvPr id="4" name="Picture 1" descr="E:\Amit Kumar Trivedi\Learning\CPP\Question Pappers\logo.png"/>
+          <p:cNvPicPr>
+            <a:picLocks noChangeAspect="1" noChangeArrowheads="1"/>
+          </p:cNvPicPr>
+          <p:nvPr/>
+        </p:nvPicPr>
+        <p:blipFill>
+          <a:blip r:embed="rId2"/>
+          <a:srcRect/>
+          <a:stretch>
+            <a:fillRect/>
+          </a:stretch>
+        </p:blipFill>
+        <p:spPr bwMode="auto">
+          <a:xfrm>
+            <a:off x="381000" y="5629275"/>
+            <a:ext cx="1000125" cy="1000125"/>
+          </a:xfrm>
+          <a:prstGeom prst="rect">
+            <a:avLst/>
+          </a:prstGeom>
+          <a:noFill/>
+        </p:spPr>
+      </p:pic>
+    </p:spTree>
+  </p:cSld>
+  <p:clrMapOvr>
+    <a:masterClrMapping/>
+  </p:clrMapOvr>
+  <p:timing>
+    <p:tnLst>
+      <p:par>
+        <p:cTn id="1" dur="indefinite" restart="never" nodeType="tmRoot"/>
+      </p:par>
+    </p:tnLst>
+  </p:timing>
+</p:sld>
+</file>
+
+<file path=ppt/slides/slide16.xml><?xml version="1.0" encoding="utf-8"?>
+<p:sld xmlns:a="http://schemas.openxmlformats.org/drawingml/2006/main" xmlns:r="http://schemas.openxmlformats.org/officeDocument/2006/relationships" xmlns:p="http://schemas.openxmlformats.org/presentationml/2006/main">
+  <p:cSld>
+    <p:spTree>
+      <p:nvGrpSpPr>
+        <p:cNvPr id="1" name=""/>
+        <p:cNvGrpSpPr/>
+        <p:nvPr/>
+      </p:nvGrpSpPr>
+      <p:grpSpPr>
+        <a:xfrm>
+          <a:off x="0" y="0"/>
+          <a:ext cx="0" cy="0"/>
+          <a:chOff x="0" y="0"/>
+          <a:chExt cx="0" cy="0"/>
+        </a:xfrm>
+      </p:grpSpPr>
+      <p:sp>
+        <p:nvSpPr>
+          <p:cNvPr id="2" name="Title 1"/>
+          <p:cNvSpPr>
+            <a:spLocks noGrp="1"/>
+          </p:cNvSpPr>
+          <p:nvPr>
+            <p:ph type="title"/>
+          </p:nvPr>
+        </p:nvSpPr>
+        <p:spPr/>
+        <p:txBody>
+          <a:bodyPr/>
+          <a:lstStyle/>
+          <a:p>
+            <a:r>
+              <a:rPr lang="en-IN" dirty="0" smtClean="0"/>
+              <a:t>Thank you</a:t>
+            </a:r>
+            <a:endParaRPr lang="en-IN" dirty="0"/>
+          </a:p>
+        </p:txBody>
+      </p:sp>
+      <p:pic>
+        <p:nvPicPr>
+          <p:cNvPr id="3" name="Picture 1" descr="E:\Amit Kumar Trivedi\Learning\CPP\Question Pappers\logo.png"/>
+          <p:cNvPicPr>
+            <a:picLocks noChangeAspect="1" noChangeArrowheads="1"/>
+          </p:cNvPicPr>
+          <p:nvPr/>
+        </p:nvPicPr>
+        <p:blipFill>
+          <a:blip r:embed="rId2"/>
+          <a:srcRect/>
+          <a:stretch>
+            <a:fillRect/>
+          </a:stretch>
+        </p:blipFill>
+        <p:spPr bwMode="auto">
+          <a:xfrm>
+            <a:off x="381000" y="5486400"/>
+            <a:ext cx="1000125" cy="1000125"/>
+          </a:xfrm>
+          <a:prstGeom prst="rect">
+            <a:avLst/>
+          </a:prstGeom>
+          <a:noFill/>
+        </p:spPr>
+      </p:pic>
+    </p:spTree>
+  </p:cSld>
+  <p:clrMapOvr>
+    <a:masterClrMapping/>
+  </p:clrMapOvr>
+  <p:timing>
+    <p:tnLst>
+      <p:par>
+        <p:cTn id="1" dur="indefinite" restart="never" nodeType="tmRoot"/>
+      </p:par>
+    </p:tnLst>
+  </p:timing>
+</p:sld>
+</file>
+
+<file path=ppt/slides/slide2.xml><?xml version="1.0" encoding="utf-8"?>
+<p:sld xmlns:a="http://schemas.openxmlformats.org/drawingml/2006/main" xmlns:r="http://schemas.openxmlformats.org/officeDocument/2006/relationships" xmlns:p="http://schemas.openxmlformats.org/presentationml/2006/main">
+  <p:cSld>
+    <p:spTree>
+      <p:nvGrpSpPr>
+        <p:cNvPr id="1" name=""/>
+        <p:cNvGrpSpPr/>
+        <p:nvPr/>
+      </p:nvGrpSpPr>
+      <p:grpSpPr>
+        <a:xfrm>
+          <a:off x="0" y="0"/>
+          <a:ext cx="0" cy="0"/>
+          <a:chOff x="0" y="0"/>
+          <a:chExt cx="0" cy="0"/>
+        </a:xfrm>
+      </p:grpSpPr>
+      <p:sp>
+        <p:nvSpPr>
+          <p:cNvPr id="2" name="Title 1"/>
+          <p:cNvSpPr>
+            <a:spLocks noGrp="1"/>
+          </p:cNvSpPr>
+          <p:nvPr>
+            <p:ph type="title"/>
+          </p:nvPr>
+        </p:nvSpPr>
+        <p:spPr/>
+        <p:txBody>
+          <a:bodyPr/>
+          <a:lstStyle/>
+          <a:p>
+            <a:r>
+              <a:rPr lang="en-IN" dirty="0" smtClean="0"/>
+              <a:t>Introduction </a:t>
+            </a:r>
+            <a:endParaRPr lang="en-IN" dirty="0"/>
+          </a:p>
+        </p:txBody>
+      </p:sp>
+      <p:sp>
+        <p:nvSpPr>
+          <p:cNvPr id="3" name="TextBox 2"/>
+          <p:cNvSpPr txBox="1"/>
+          <p:nvPr/>
+        </p:nvSpPr>
+        <p:spPr>
+          <a:xfrm>
+            <a:off x="1295400" y="1905000"/>
+            <a:ext cx="7010400" cy="1754326"/>
+          </a:xfrm>
+          <a:prstGeom prst="rect">
+            <a:avLst/>
+          </a:prstGeom>
+          <a:noFill/>
+        </p:spPr>
+        <p:txBody>
+          <a:bodyPr wrap="square" rtlCol="0">
+            <a:spAutoFit/>
+          </a:bodyPr>
+          <a:lstStyle/>
+          <a:p>
+            <a:r>
+              <a:rPr lang="en-IN" dirty="0" smtClean="0"/>
+              <a:t>Basics of Function. </a:t>
+            </a:r>
+          </a:p>
+          <a:p>
+            <a:r>
+              <a:rPr lang="en-IN" dirty="0" smtClean="0"/>
+              <a:t>Different types of Function </a:t>
+            </a:r>
+          </a:p>
+          <a:p>
+            <a:r>
+              <a:rPr lang="en-IN" dirty="0" smtClean="0"/>
+              <a:t>Function and Class</a:t>
+            </a:r>
+          </a:p>
+          <a:p>
+            <a:r>
+              <a:rPr lang="en-IN" dirty="0" smtClean="0"/>
+              <a:t>Function which takes class object as argument </a:t>
+            </a:r>
+          </a:p>
+          <a:p>
+            <a:r>
+              <a:rPr lang="en-IN" dirty="0" smtClean="0"/>
+              <a:t>Function which returns class object as value </a:t>
+            </a:r>
+          </a:p>
+          <a:p>
+            <a:endParaRPr lang="en-IN" dirty="0"/>
+          </a:p>
+        </p:txBody>
+      </p:sp>
+    </p:spTree>
+  </p:cSld>
+  <p:clrMapOvr>
+    <a:masterClrMapping/>
+  </p:clrMapOvr>
+</p:sld>
+</file>
+
+<file path=ppt/slides/slide3.xml><?xml version="1.0" encoding="utf-8"?>
+<p:sld xmlns:a="http://schemas.openxmlformats.org/drawingml/2006/main" xmlns:r="http://schemas.openxmlformats.org/officeDocument/2006/relationships" xmlns:p="http://schemas.openxmlformats.org/presentationml/2006/main">
+  <p:cSld>
+    <p:spTree>
+      <p:nvGrpSpPr>
+        <p:cNvPr id="1" name=""/>
+        <p:cNvGrpSpPr/>
+        <p:nvPr/>
+      </p:nvGrpSpPr>
+      <p:grpSpPr>
+        <a:xfrm>
+          <a:off x="0" y="0"/>
+          <a:ext cx="0" cy="0"/>
+          <a:chOff x="0" y="0"/>
+          <a:chExt cx="0" cy="0"/>
+        </a:xfrm>
+      </p:grpSpPr>
+      <p:sp>
+        <p:nvSpPr>
+          <p:cNvPr id="2" name="Title 1"/>
+          <p:cNvSpPr>
+            <a:spLocks noGrp="1"/>
+          </p:cNvSpPr>
+          <p:nvPr>
+            <p:ph type="title"/>
+          </p:nvPr>
+        </p:nvSpPr>
+        <p:spPr/>
+        <p:txBody>
+          <a:bodyPr/>
+          <a:lstStyle/>
+          <a:p>
+            <a:pPr fontAlgn="base"/>
+            <a:r>
+              <a:rPr lang="en-IN" dirty="0" smtClean="0"/>
+              <a:t>Basics of Function</a:t>
+            </a:r>
+            <a:endParaRPr lang="en-IN" dirty="0"/>
+          </a:p>
+        </p:txBody>
+      </p:sp>
+      <p:sp>
+        <p:nvSpPr>
+          <p:cNvPr id="4" name="TextBox 3"/>
+          <p:cNvSpPr txBox="1"/>
+          <p:nvPr/>
+        </p:nvSpPr>
+        <p:spPr>
+          <a:xfrm>
+            <a:off x="1524000" y="1066800"/>
+            <a:ext cx="7010400" cy="646331"/>
+          </a:xfrm>
+          <a:prstGeom prst="rect">
+            <a:avLst/>
+          </a:prstGeom>
+          <a:noFill/>
+        </p:spPr>
+        <p:txBody>
+          <a:bodyPr wrap="square" rtlCol="0">
+            <a:spAutoFit/>
+          </a:bodyPr>
+          <a:lstStyle/>
+          <a:p>
+            <a:r>
+              <a:rPr lang="en-IN" dirty="0" smtClean="0"/>
+              <a:t>Simple Functions which takes no argument and return nothing. </a:t>
+            </a:r>
+          </a:p>
+          <a:p>
+            <a:endParaRPr lang="en-IN" dirty="0"/>
+          </a:p>
+        </p:txBody>
+      </p:sp>
+      <p:pic>
+        <p:nvPicPr>
+          <p:cNvPr id="6" name="Picture 1" descr="E:\Amit Kumar Trivedi\Learning\CPP\Question Pappers\logo.png"/>
+          <p:cNvPicPr>
+            <a:picLocks noChangeAspect="1" noChangeArrowheads="1"/>
+          </p:cNvPicPr>
+          <p:nvPr/>
+        </p:nvPicPr>
+        <p:blipFill>
+          <a:blip r:embed="rId2"/>
+          <a:srcRect/>
+          <a:stretch>
+            <a:fillRect/>
+          </a:stretch>
+        </p:blipFill>
+        <p:spPr bwMode="auto">
+          <a:xfrm>
+            <a:off x="381000" y="5486400"/>
+            <a:ext cx="1000125" cy="1000125"/>
+          </a:xfrm>
+          <a:prstGeom prst="rect">
+            <a:avLst/>
+          </a:prstGeom>
+          <a:noFill/>
+        </p:spPr>
+      </p:pic>
+      <p:pic>
+        <p:nvPicPr>
+          <p:cNvPr id="1028" name="Picture 4"/>
+          <p:cNvPicPr>
+            <a:picLocks noChangeAspect="1" noChangeArrowheads="1"/>
+          </p:cNvPicPr>
+          <p:nvPr/>
+        </p:nvPicPr>
+        <p:blipFill>
+          <a:blip r:embed="rId3"/>
+          <a:srcRect/>
+          <a:stretch>
+            <a:fillRect/>
+          </a:stretch>
+        </p:blipFill>
+        <p:spPr bwMode="auto">
+          <a:xfrm>
+            <a:off x="1066800" y="1676400"/>
+            <a:ext cx="7065963" cy="4295775"/>
+          </a:xfrm>
+          <a:prstGeom prst="rect">
+            <a:avLst/>
+          </a:prstGeom>
+          <a:noFill/>
+          <a:ln w="9525">
+            <a:noFill/>
+            <a:miter lim="800000"/>
+            <a:headEnd/>
+            <a:tailEnd/>
+          </a:ln>
+          <a:effectLst/>
+        </p:spPr>
+      </p:pic>
+    </p:spTree>
+  </p:cSld>
+  <p:clrMapOvr>
+    <a:masterClrMapping/>
+  </p:clrMapOvr>
+  <p:timing>
+    <p:tnLst>
+      <p:par>
+        <p:cTn id="1" dur="indefinite" restart="never" nodeType="tmRoot"/>
+      </p:par>
+    </p:tnLst>
+  </p:timing>
+</p:sld>
+</file>
+
+<file path=ppt/slides/slide4.xml><?xml version="1.0" encoding="utf-8"?>
+<p:sld xmlns:a="http://schemas.openxmlformats.org/drawingml/2006/main" xmlns:r="http://schemas.openxmlformats.org/officeDocument/2006/relationships" xmlns:p="http://schemas.openxmlformats.org/presentationml/2006/main">
+  <p:cSld>
+    <p:spTree>
+      <p:nvGrpSpPr>
+        <p:cNvPr id="1" name=""/>
+        <p:cNvGrpSpPr/>
+        <p:nvPr/>
+      </p:nvGrpSpPr>
+      <p:grpSpPr>
+        <a:xfrm>
+          <a:off x="0" y="0"/>
+          <a:ext cx="0" cy="0"/>
+          <a:chOff x="0" y="0"/>
+          <a:chExt cx="0" cy="0"/>
+        </a:xfrm>
+      </p:grpSpPr>
+      <p:sp>
+        <p:nvSpPr>
+          <p:cNvPr id="2" name="Title 1"/>
+          <p:cNvSpPr>
+            <a:spLocks noGrp="1"/>
+          </p:cNvSpPr>
+          <p:nvPr>
+            <p:ph type="title"/>
+          </p:nvPr>
+        </p:nvSpPr>
+        <p:spPr/>
+        <p:txBody>
+          <a:bodyPr/>
+          <a:lstStyle/>
+          <a:p>
+            <a:pPr fontAlgn="base"/>
+            <a:r>
+              <a:rPr lang="en-IN" dirty="0" smtClean="0"/>
+              <a:t>Functions Parameters </a:t>
+            </a:r>
+            <a:endParaRPr lang="en-IN" dirty="0"/>
+          </a:p>
+        </p:txBody>
+      </p:sp>
+      <p:sp>
+        <p:nvSpPr>
+          <p:cNvPr id="4" name="TextBox 3"/>
+          <p:cNvSpPr txBox="1"/>
+          <p:nvPr/>
+        </p:nvSpPr>
+        <p:spPr>
+          <a:xfrm>
+            <a:off x="1524000" y="1066800"/>
+            <a:ext cx="7010400" cy="646331"/>
+          </a:xfrm>
+          <a:prstGeom prst="rect">
+            <a:avLst/>
+          </a:prstGeom>
+          <a:noFill/>
+        </p:spPr>
+        <p:txBody>
+          <a:bodyPr wrap="square" rtlCol="0">
+            <a:spAutoFit/>
+          </a:bodyPr>
+          <a:lstStyle/>
+          <a:p>
+            <a:r>
+              <a:rPr lang="en-IN" dirty="0" smtClean="0"/>
+              <a:t>Function which take one arguments/parameter </a:t>
+            </a:r>
+          </a:p>
+          <a:p>
+            <a:endParaRPr lang="en-IN" dirty="0"/>
+          </a:p>
+        </p:txBody>
+      </p:sp>
+      <p:pic>
+        <p:nvPicPr>
+          <p:cNvPr id="6" name="Picture 1" descr="E:\Amit Kumar Trivedi\Learning\CPP\Question Pappers\logo.png"/>
+          <p:cNvPicPr>
+            <a:picLocks noChangeAspect="1" noChangeArrowheads="1"/>
+          </p:cNvPicPr>
+          <p:nvPr/>
+        </p:nvPicPr>
+        <p:blipFill>
+          <a:blip r:embed="rId2"/>
+          <a:srcRect/>
+          <a:stretch>
+            <a:fillRect/>
+          </a:stretch>
+        </p:blipFill>
+        <p:spPr bwMode="auto">
+          <a:xfrm>
+            <a:off x="0" y="6162675"/>
+            <a:ext cx="695325" cy="695325"/>
+          </a:xfrm>
+          <a:prstGeom prst="rect">
+            <a:avLst/>
+          </a:prstGeom>
+          <a:noFill/>
+        </p:spPr>
+      </p:pic>
+      <p:pic>
+        <p:nvPicPr>
+          <p:cNvPr id="1029" name="Picture 5" descr="E:\Amit Kumar Trivedi\Learning\CPP\Course Content\Section 2 Class and Objects\images\funtion with parameter.PNG"/>
+          <p:cNvPicPr>
+            <a:picLocks noChangeAspect="1" noChangeArrowheads="1"/>
+          </p:cNvPicPr>
+          <p:nvPr/>
+        </p:nvPicPr>
+        <p:blipFill>
+          <a:blip r:embed="rId3"/>
+          <a:srcRect/>
+          <a:stretch>
+            <a:fillRect/>
+          </a:stretch>
+        </p:blipFill>
+        <p:spPr bwMode="auto">
+          <a:xfrm>
+            <a:off x="228600" y="1600200"/>
+            <a:ext cx="8704263" cy="4400550"/>
+          </a:xfrm>
+          <a:prstGeom prst="rect">
+            <a:avLst/>
+          </a:prstGeom>
+          <a:noFill/>
+        </p:spPr>
+      </p:pic>
+    </p:spTree>
+  </p:cSld>
+  <p:clrMapOvr>
+    <a:masterClrMapping/>
+  </p:clrMapOvr>
+  <p:timing>
+    <p:tnLst>
+      <p:par>
+        <p:cTn id="1" dur="indefinite" restart="never" nodeType="tmRoot"/>
+      </p:par>
+    </p:tnLst>
+  </p:timing>
+</p:sld>
+</file>
+
+<file path=ppt/slides/slide5.xml><?xml version="1.0" encoding="utf-8"?>
+<p:sld xmlns:a="http://schemas.openxmlformats.org/drawingml/2006/main" xmlns:r="http://schemas.openxmlformats.org/officeDocument/2006/relationships" xmlns:p="http://schemas.openxmlformats.org/presentationml/2006/main">
+  <p:cSld>
+    <p:spTree>
+      <p:nvGrpSpPr>
+        <p:cNvPr id="1" name=""/>
+        <p:cNvGrpSpPr/>
+        <p:nvPr/>
+      </p:nvGrpSpPr>
+      <p:grpSpPr>
+        <a:xfrm>
+          <a:off x="0" y="0"/>
+          <a:ext cx="0" cy="0"/>
+          <a:chOff x="0" y="0"/>
+          <a:chExt cx="0" cy="0"/>
+        </a:xfrm>
+      </p:grpSpPr>
+      <p:sp>
+        <p:nvSpPr>
+          <p:cNvPr id="2" name="Title 1"/>
+          <p:cNvSpPr>
+            <a:spLocks noGrp="1"/>
+          </p:cNvSpPr>
+          <p:nvPr>
+            <p:ph type="title"/>
+          </p:nvPr>
+        </p:nvSpPr>
+        <p:spPr/>
+        <p:txBody>
+          <a:bodyPr/>
+          <a:lstStyle/>
+          <a:p>
+            <a:r>
+              <a:rPr lang="en-IN" dirty="0" smtClean="0"/>
+              <a:t>Function calling Mechanism </a:t>
+            </a:r>
+            <a:endParaRPr lang="en-IN" dirty="0"/>
+          </a:p>
+        </p:txBody>
+      </p:sp>
+      <p:sp>
+        <p:nvSpPr>
+          <p:cNvPr id="4" name="TextBox 3"/>
+          <p:cNvSpPr txBox="1"/>
+          <p:nvPr/>
+        </p:nvSpPr>
+        <p:spPr>
+          <a:xfrm>
+            <a:off x="1295400" y="1905000"/>
+            <a:ext cx="7010400" cy="2862322"/>
+          </a:xfrm>
+          <a:prstGeom prst="rect">
+            <a:avLst/>
+          </a:prstGeom>
+          <a:noFill/>
+        </p:spPr>
+        <p:txBody>
+          <a:bodyPr wrap="square" rtlCol="0">
+            <a:spAutoFit/>
+          </a:bodyPr>
+          <a:lstStyle/>
+          <a:p>
+            <a:r>
+              <a:rPr lang="en-IN" dirty="0" smtClean="0"/>
+              <a:t>When function encounter </a:t>
+            </a:r>
+          </a:p>
+          <a:p>
+            <a:r>
+              <a:rPr lang="en-IN" dirty="0" smtClean="0"/>
+              <a:t>Hold the execution of the current program</a:t>
+            </a:r>
+          </a:p>
+          <a:p>
+            <a:r>
+              <a:rPr lang="en-IN" dirty="0" smtClean="0"/>
+              <a:t>Check if function exist</a:t>
+            </a:r>
+          </a:p>
+          <a:p>
+            <a:r>
+              <a:rPr lang="en-IN" dirty="0" smtClean="0"/>
+              <a:t>Do function call </a:t>
+            </a:r>
+          </a:p>
+          <a:p>
+            <a:r>
+              <a:rPr lang="en-IN" dirty="0" smtClean="0"/>
+              <a:t>Copy actual parameter to formal parameter</a:t>
+            </a:r>
+          </a:p>
+          <a:p>
+            <a:r>
+              <a:rPr lang="en-IN" dirty="0" smtClean="0"/>
+              <a:t>Start execution of the called function</a:t>
+            </a:r>
+          </a:p>
+          <a:p>
+            <a:r>
+              <a:rPr lang="en-IN" dirty="0" smtClean="0"/>
+              <a:t>When completed </a:t>
+            </a:r>
+          </a:p>
+          <a:p>
+            <a:r>
+              <a:rPr lang="en-IN" dirty="0" smtClean="0"/>
+              <a:t>Return Function </a:t>
+            </a:r>
+          </a:p>
+          <a:p>
+            <a:r>
+              <a:rPr lang="en-IN" dirty="0" smtClean="0"/>
+              <a:t>Resume the execution from paused point </a:t>
+            </a:r>
+          </a:p>
+          <a:p>
+            <a:endParaRPr lang="en-IN" dirty="0"/>
+          </a:p>
+        </p:txBody>
+      </p:sp>
+    </p:spTree>
+  </p:cSld>
+  <p:clrMapOvr>
+    <a:masterClrMapping/>
+  </p:clrMapOvr>
+</p:sld>
+</file>
+
+<file path=ppt/slides/slide6.xml><?xml version="1.0" encoding="utf-8"?>
+<p:sld xmlns:a="http://schemas.openxmlformats.org/drawingml/2006/main" xmlns:r="http://schemas.openxmlformats.org/officeDocument/2006/relationships" xmlns:p="http://schemas.openxmlformats.org/presentationml/2006/main">
+  <p:cSld>
+    <p:spTree>
+      <p:nvGrpSpPr>
+        <p:cNvPr id="1" name=""/>
+        <p:cNvGrpSpPr/>
+        <p:nvPr/>
+      </p:nvGrpSpPr>
+      <p:grpSpPr>
+        <a:xfrm>
+          <a:off x="0" y="0"/>
+          <a:ext cx="0" cy="0"/>
+          <a:chOff x="0" y="0"/>
+          <a:chExt cx="0" cy="0"/>
+        </a:xfrm>
+      </p:grpSpPr>
+      <p:sp>
+        <p:nvSpPr>
+          <p:cNvPr id="5" name="Title 1"/>
+          <p:cNvSpPr>
+            <a:spLocks noGrp="1"/>
+          </p:cNvSpPr>
+          <p:nvPr>
+            <p:ph type="title"/>
+          </p:nvPr>
+        </p:nvSpPr>
+        <p:spPr>
+          <a:xfrm>
+            <a:off x="457200" y="274638"/>
+            <a:ext cx="8229600" cy="1143000"/>
+          </a:xfrm>
+        </p:spPr>
+        <p:txBody>
+          <a:bodyPr/>
+          <a:lstStyle/>
+          <a:p>
+            <a:r>
+              <a:rPr lang="en-IN" dirty="0" smtClean="0"/>
+              <a:t>Dry Run</a:t>
+            </a:r>
+            <a:endParaRPr lang="en-IN" dirty="0"/>
+          </a:p>
+        </p:txBody>
+      </p:sp>
+      <p:sp>
+        <p:nvSpPr>
+          <p:cNvPr id="6" name="TextBox 5"/>
+          <p:cNvSpPr txBox="1"/>
+          <p:nvPr/>
+        </p:nvSpPr>
+        <p:spPr>
+          <a:xfrm>
+            <a:off x="5562600" y="1676400"/>
+            <a:ext cx="3276600" cy="3416320"/>
+          </a:xfrm>
+          <a:prstGeom prst="rect">
+            <a:avLst/>
+          </a:prstGeom>
+          <a:noFill/>
+        </p:spPr>
+        <p:txBody>
+          <a:bodyPr wrap="square" rtlCol="0">
+            <a:spAutoFit/>
+          </a:bodyPr>
+          <a:lstStyle/>
+          <a:p>
+            <a:r>
+              <a:rPr lang="en-IN" dirty="0" smtClean="0"/>
+              <a:t>Step 1</a:t>
+            </a:r>
+          </a:p>
+          <a:p>
+            <a:r>
+              <a:rPr lang="en-IN" dirty="0" smtClean="0"/>
+              <a:t>(function call : </a:t>
+            </a:r>
+            <a:r>
+              <a:rPr lang="en-IN" dirty="0" err="1" smtClean="0"/>
+              <a:t>printme</a:t>
+            </a:r>
+            <a:r>
+              <a:rPr lang="en-IN" dirty="0" smtClean="0"/>
+              <a:t>  p1=34)</a:t>
+            </a:r>
+          </a:p>
+          <a:p>
+            <a:r>
+              <a:rPr lang="en-IN" dirty="0" smtClean="0"/>
+              <a:t>Step 7</a:t>
+            </a:r>
+          </a:p>
+          <a:p>
+            <a:r>
+              <a:rPr lang="en-IN" dirty="0" smtClean="0"/>
+              <a:t>p1=34</a:t>
+            </a:r>
+          </a:p>
+          <a:p>
+            <a:r>
+              <a:rPr lang="en-IN" dirty="0" smtClean="0"/>
+              <a:t>Step 9</a:t>
+            </a:r>
+          </a:p>
+          <a:p>
+            <a:r>
+              <a:rPr lang="en-IN" dirty="0" smtClean="0"/>
+              <a:t>(function return to main) </a:t>
+            </a:r>
+          </a:p>
+          <a:p>
+            <a:r>
+              <a:rPr lang="en-IN" dirty="0" smtClean="0"/>
+              <a:t>Step 10 </a:t>
+            </a:r>
+          </a:p>
+          <a:p>
+            <a:r>
+              <a:rPr lang="en-IN" dirty="0" smtClean="0"/>
+              <a:t>(</a:t>
+            </a:r>
+            <a:r>
+              <a:rPr lang="en-IN" dirty="0" err="1" smtClean="0"/>
+              <a:t>fucntion</a:t>
+            </a:r>
+            <a:r>
+              <a:rPr lang="en-IN" dirty="0" smtClean="0"/>
+              <a:t> call p1=63)</a:t>
+            </a:r>
+          </a:p>
+          <a:p>
+            <a:r>
+              <a:rPr lang="en-IN" dirty="0" smtClean="0"/>
+              <a:t>Step 7</a:t>
+            </a:r>
+          </a:p>
+          <a:p>
+            <a:r>
+              <a:rPr lang="en-IN" dirty="0" smtClean="0"/>
+              <a:t>p1=63</a:t>
+            </a:r>
+          </a:p>
+          <a:p>
+            <a:r>
+              <a:rPr lang="en-IN" dirty="0" smtClean="0"/>
+              <a:t>Step 9</a:t>
+            </a:r>
+          </a:p>
+          <a:p>
+            <a:r>
+              <a:rPr lang="en-IN" dirty="0" smtClean="0"/>
+              <a:t>(function</a:t>
+            </a:r>
+            <a:endParaRPr lang="en-IN" dirty="0"/>
+          </a:p>
+        </p:txBody>
+      </p:sp>
+    </p:spTree>
+  </p:cSld>
+  <p:clrMapOvr>
+    <a:masterClrMapping/>
+  </p:clrMapOvr>
+</p:sld>
+</file>
+
+<file path=ppt/slides/slide7.xml><?xml version="1.0" encoding="utf-8"?>
+<p:sld xmlns:a="http://schemas.openxmlformats.org/drawingml/2006/main" xmlns:r="http://schemas.openxmlformats.org/officeDocument/2006/relationships" xmlns:p="http://schemas.openxmlformats.org/presentationml/2006/main">
+  <p:cSld>
+    <p:spTree>
+      <p:nvGrpSpPr>
+        <p:cNvPr id="1" name=""/>
+        <p:cNvGrpSpPr/>
+        <p:nvPr/>
+      </p:nvGrpSpPr>
+      <p:grpSpPr>
+        <a:xfrm>
+          <a:off x="0" y="0"/>
+          <a:ext cx="0" cy="0"/>
+          <a:chOff x="0" y="0"/>
+          <a:chExt cx="0" cy="0"/>
+        </a:xfrm>
+      </p:grpSpPr>
+      <p:sp>
+        <p:nvSpPr>
+          <p:cNvPr id="2" name="Title 1"/>
+          <p:cNvSpPr>
+            <a:spLocks noGrp="1"/>
+          </p:cNvSpPr>
+          <p:nvPr>
+            <p:ph type="title"/>
+          </p:nvPr>
+        </p:nvSpPr>
+        <p:spPr/>
+        <p:txBody>
+          <a:bodyPr/>
+          <a:lstStyle/>
+          <a:p>
+            <a:pPr fontAlgn="base"/>
+            <a:r>
+              <a:rPr lang="en-IN" dirty="0" smtClean="0"/>
+              <a:t> Functions returns value </a:t>
+            </a:r>
+            <a:endParaRPr lang="en-IN" dirty="0"/>
+          </a:p>
+        </p:txBody>
+      </p:sp>
+      <p:sp>
+        <p:nvSpPr>
+          <p:cNvPr id="4" name="TextBox 3"/>
+          <p:cNvSpPr txBox="1"/>
+          <p:nvPr/>
+        </p:nvSpPr>
+        <p:spPr>
+          <a:xfrm>
+            <a:off x="1524000" y="1066800"/>
+            <a:ext cx="7010400" cy="646331"/>
+          </a:xfrm>
+          <a:prstGeom prst="rect">
+            <a:avLst/>
+          </a:prstGeom>
+          <a:noFill/>
+        </p:spPr>
+        <p:txBody>
+          <a:bodyPr wrap="square" rtlCol="0">
+            <a:spAutoFit/>
+          </a:bodyPr>
+          <a:lstStyle/>
+          <a:p>
+            <a:r>
+              <a:rPr lang="en-IN" dirty="0" smtClean="0"/>
+              <a:t>Simple Functions which takes  argument and return VALUE</a:t>
+            </a:r>
+          </a:p>
+          <a:p>
+            <a:endParaRPr lang="en-IN" dirty="0"/>
+          </a:p>
+        </p:txBody>
+      </p:sp>
+      <p:pic>
+        <p:nvPicPr>
+          <p:cNvPr id="6" name="Picture 1" descr="E:\Amit Kumar Trivedi\Learning\CPP\Question Pappers\logo.png"/>
+          <p:cNvPicPr>
+            <a:picLocks noChangeAspect="1" noChangeArrowheads="1"/>
+          </p:cNvPicPr>
+          <p:nvPr/>
+        </p:nvPicPr>
+        <p:blipFill>
+          <a:blip r:embed="rId2"/>
+          <a:srcRect/>
+          <a:stretch>
+            <a:fillRect/>
+          </a:stretch>
+        </p:blipFill>
+        <p:spPr bwMode="auto">
+          <a:xfrm>
+            <a:off x="381000" y="5486400"/>
+            <a:ext cx="1000125" cy="1000125"/>
+          </a:xfrm>
+          <a:prstGeom prst="rect">
+            <a:avLst/>
+          </a:prstGeom>
+          <a:noFill/>
+        </p:spPr>
+      </p:pic>
+      <p:pic>
+        <p:nvPicPr>
+          <p:cNvPr id="3074" name="Picture 2" descr="E:\Amit Kumar Trivedi\Learning\CPP\Course Content\Section 2 Class and Objects\images\fucntion return value.PNG"/>
+          <p:cNvPicPr>
+            <a:picLocks noChangeAspect="1" noChangeArrowheads="1"/>
+          </p:cNvPicPr>
+          <p:nvPr/>
+        </p:nvPicPr>
+        <p:blipFill>
+          <a:blip r:embed="rId3"/>
+          <a:srcRect/>
+          <a:stretch>
+            <a:fillRect/>
+          </a:stretch>
+        </p:blipFill>
+        <p:spPr bwMode="auto">
+          <a:xfrm>
+            <a:off x="715963" y="1476375"/>
+            <a:ext cx="8275637" cy="4772025"/>
+          </a:xfrm>
+          <a:prstGeom prst="rect">
+            <a:avLst/>
+          </a:prstGeom>
+          <a:noFill/>
+        </p:spPr>
+      </p:pic>
+    </p:spTree>
+  </p:cSld>
+  <p:clrMapOvr>
+    <a:masterClrMapping/>
+  </p:clrMapOvr>
+  <p:timing>
+    <p:tnLst>
+      <p:par>
+        <p:cTn id="1" dur="indefinite" restart="never" nodeType="tmRoot"/>
+      </p:par>
+    </p:tnLst>
+  </p:timing>
+</p:sld>
+</file>
+
+<file path=ppt/slides/slide8.xml><?xml version="1.0" encoding="utf-8"?>
+<p:sld xmlns:a="http://schemas.openxmlformats.org/drawingml/2006/main" xmlns:r="http://schemas.openxmlformats.org/officeDocument/2006/relationships" xmlns:p="http://schemas.openxmlformats.org/presentationml/2006/main">
+  <p:cSld>
+    <p:spTree>
+      <p:nvGrpSpPr>
+        <p:cNvPr id="1" name=""/>
+        <p:cNvGrpSpPr/>
+        <p:nvPr/>
+      </p:nvGrpSpPr>
+      <p:grpSpPr>
+        <a:xfrm>
+          <a:off x="0" y="0"/>
+          <a:ext cx="0" cy="0"/>
+          <a:chOff x="0" y="0"/>
+          <a:chExt cx="0" cy="0"/>
+        </a:xfrm>
+      </p:grpSpPr>
+      <p:sp>
+        <p:nvSpPr>
+          <p:cNvPr id="2" name="Title 1"/>
+          <p:cNvSpPr>
+            <a:spLocks noGrp="1"/>
+          </p:cNvSpPr>
+          <p:nvPr>
+            <p:ph type="title"/>
+          </p:nvPr>
+        </p:nvSpPr>
+        <p:spPr/>
+        <p:txBody>
+          <a:bodyPr/>
+          <a:lstStyle/>
+          <a:p>
+            <a:endParaRPr lang="en-IN"/>
+          </a:p>
+        </p:txBody>
+      </p:sp>
+    </p:spTree>
+  </p:cSld>
+  <p:clrMapOvr>
+    <a:masterClrMapping/>
+  </p:clrMapOvr>
+</p:sld>
+</file>
+
+<file path=ppt/slides/slide9.xml><?xml version="1.0" encoding="utf-8"?>
+<p:sld xmlns:a="http://schemas.openxmlformats.org/drawingml/2006/main" xmlns:r="http://schemas.openxmlformats.org/officeDocument/2006/relationships" xmlns:p="http://schemas.openxmlformats.org/presentationml/2006/main">
+  <p:cSld>
+    <p:spTree>
+      <p:nvGrpSpPr>
+        <p:cNvPr id="1" name=""/>
+        <p:cNvGrpSpPr/>
+        <p:nvPr/>
+      </p:nvGrpSpPr>
+      <p:grpSpPr>
+        <a:xfrm>
+          <a:off x="0" y="0"/>
+          <a:ext cx="0" cy="0"/>
+          <a:chOff x="0" y="0"/>
+          <a:chExt cx="0" cy="0"/>
+        </a:xfrm>
+      </p:grpSpPr>
+      <p:sp>
+        <p:nvSpPr>
+          <p:cNvPr id="2" name="Title 1"/>
+          <p:cNvSpPr>
+            <a:spLocks noGrp="1"/>
+          </p:cNvSpPr>
+          <p:nvPr>
+            <p:ph type="title"/>
+          </p:nvPr>
+        </p:nvSpPr>
+        <p:spPr/>
+        <p:txBody>
+          <a:bodyPr/>
+          <a:lstStyle/>
+          <a:p>
+            <a:r>
+              <a:rPr lang="en-IN" dirty="0" smtClean="0"/>
+              <a:t>Assignment</a:t>
+            </a:r>
+            <a:endParaRPr lang="en-IN" dirty="0"/>
+          </a:p>
+        </p:txBody>
+      </p:sp>
+      <p:sp>
+        <p:nvSpPr>
+          <p:cNvPr id="3" name="TextBox 2"/>
+          <p:cNvSpPr txBox="1"/>
+          <p:nvPr/>
+        </p:nvSpPr>
+        <p:spPr>
+          <a:xfrm>
+            <a:off x="1524000" y="1981200"/>
+            <a:ext cx="7010400" cy="923330"/>
+          </a:xfrm>
+          <a:prstGeom prst="rect">
+            <a:avLst/>
+          </a:prstGeom>
+          <a:noFill/>
+        </p:spPr>
+        <p:txBody>
+          <a:bodyPr wrap="square" rtlCol="0">
+            <a:spAutoFit/>
+          </a:bodyPr>
+          <a:lstStyle/>
+          <a:p>
+            <a:r>
+              <a:rPr lang="en-IN" dirty="0" smtClean="0"/>
+              <a:t>Create a function called sum. </a:t>
+            </a:r>
+          </a:p>
+          <a:p>
+            <a:r>
+              <a:rPr lang="en-IN" dirty="0" smtClean="0"/>
+              <a:t>Which takes two numbers as argument. </a:t>
+            </a:r>
+          </a:p>
+          <a:p>
+            <a:r>
+              <a:rPr lang="en-IN" dirty="0" smtClean="0"/>
+              <a:t>Function Return sum of the number passed in the argument. </a:t>
+            </a:r>
+            <a:endParaRPr lang="en-IN" dirty="0"/>
+          </a:p>
+        </p:txBody>
+      </p:sp>
     </p:spTree>
   </p:cSld>
   <p:clrMapOvr>

</xml_diff>